<commit_message>
Added auto number scaling to make numbers stylized for the deck
</commit_message>
<xml_diff>
--- a/pull_test.pptx
+++ b/pull_test.pptx
@@ -69,7 +69,7 @@
         <p:txBody>
           <a:bodyPr/>
           <a:p>
-            <a:fld id="{1567D91D-1AB3-4856-BF30-7FDBCA3015ED}" type="slidenum">
+            <a:fld id="{1448D755-A7EB-462D-9233-A4D29380605B}" type="slidenum">
               <a:t>&lt;#&gt;</a:t>
             </a:fld>
           </a:p>
@@ -232,7 +232,7 @@
         <p:txBody>
           <a:bodyPr/>
           <a:p>
-            <a:fld id="{198DC8B6-5717-425A-9C1E-C99E243814CA}" type="slidenum">
+            <a:fld id="{E10FA086-BB6A-4A5E-A55C-14E8F3484E64}" type="slidenum">
               <a:t>&lt;#&gt;</a:t>
             </a:fld>
           </a:p>
@@ -398,7 +398,7 @@
         <p:txBody>
           <a:bodyPr/>
           <a:p>
-            <a:fld id="{BABEAFFF-96C7-4034-9642-453F45265642}" type="slidenum">
+            <a:fld id="{9CB434BE-90BA-4579-BD61-1FF0EEBF361D}" type="slidenum">
               <a:t>&lt;#&gt;</a:t>
             </a:fld>
           </a:p>
@@ -481,7 +481,7 @@
         <p:txBody>
           <a:bodyPr/>
           <a:p>
-            <a:fld id="{5F067B67-2CAA-4471-8B38-D06E36A25080}" type="slidenum">
+            <a:fld id="{16685791-4374-4D79-A19F-1E0345F07327}" type="slidenum">
               <a:t>&lt;#&gt;</a:t>
             </a:fld>
           </a:p>
@@ -564,7 +564,7 @@
         <p:txBody>
           <a:bodyPr/>
           <a:p>
-            <a:fld id="{41C263F7-3DDB-436A-9C0C-4D04268C965C}" type="slidenum">
+            <a:fld id="{DDE6C558-CFE1-4156-9AA6-479533D27860}" type="slidenum">
               <a:t>&lt;#&gt;</a:t>
             </a:fld>
           </a:p>
@@ -800,7 +800,7 @@
                 <a:tab algn="l" pos="0"/>
               </a:tabLst>
             </a:pPr>
-            <a:fld id="{C1E400CC-3124-4FE5-BFE7-04C62B65DB3A}" type="slidenum">
+            <a:fld id="{4C425D0F-42E7-410D-AE5C-D1607603740C}" type="slidenum">
               <a:rPr b="0" lang="en-US" sz="2400" spc="-1" strike="noStrike">
                 <a:solidFill>
                   <a:srgbClr val="dbf5f9"/>
@@ -1142,7 +1142,7 @@
                 <a:tab algn="l" pos="0"/>
               </a:tabLst>
             </a:pPr>
-            <a:fld id="{E1D6FDAC-636E-46BB-B4F7-E47E50E038D6}" type="slidenum">
+            <a:fld id="{83B5126E-4C4C-445D-ACC6-8D597DF595A0}" type="slidenum">
               <a:rPr b="0" lang="en-US" sz="2400" spc="-1" strike="noStrike">
                 <a:solidFill>
                   <a:srgbClr val="dbf5f9"/>
@@ -1930,7 +1930,7 @@
                 <a:tab algn="l" pos="0"/>
               </a:tabLst>
             </a:pPr>
-            <a:fld id="{209B7070-52BC-439F-B796-7F9A8A7A1484}" type="slidenum">
+            <a:fld id="{CFD0BE14-9CE8-4B99-B18C-A199BBF16091}" type="slidenum">
               <a:rPr b="0" lang="en-US" sz="2400" spc="-1" strike="noStrike">
                 <a:solidFill>
                   <a:srgbClr val="484848"/>
@@ -2217,7 +2217,7 @@
                 <a:tab algn="l" pos="0"/>
               </a:tabLst>
             </a:pPr>
-            <a:fld id="{BA842463-A1E4-441D-ACCE-FD0C9105BEAA}" type="slidenum">
+            <a:fld id="{F2EC1D60-B485-4DD0-9594-750803006540}" type="slidenum">
               <a:rPr b="0" lang="en-US" sz="2400" spc="-1" strike="noStrike">
                 <a:solidFill>
                   <a:srgbClr val="484848"/>
@@ -2561,7 +2561,7 @@
                 <a:tab algn="l" pos="0"/>
               </a:tabLst>
             </a:pPr>
-            <a:fld id="{251A8AE5-090B-4408-BB22-F3D2F94F25D6}" type="slidenum">
+            <a:fld id="{E9B81675-B75C-4E0F-9996-D3AC632F9704}" type="slidenum">
               <a:rPr b="0" lang="en-US" sz="2400" spc="-1" strike="noStrike">
                 <a:solidFill>
                   <a:srgbClr val="484848"/>
@@ -3127,13 +3127,14 @@
         </p:nvGraphicFramePr>
         <p:xfrm>
           <a:off x="237960" y="1687680"/>
-          <a:ext cx="12630960" cy="2361960"/>
+          <a:ext cx="12630960" cy="1924200"/>
         </p:xfrm>
         <a:graphic>
           <a:graphicData uri="http://schemas.openxmlformats.org/drawingml/2006/table">
             <a:tbl>
               <a:tblPr/>
               <a:tblGrid>
+                <a:gridCol w="1804320"/>
                 <a:gridCol w="1804320"/>
                 <a:gridCol w="1804320"/>
                 <a:gridCol w="1804320"/>
@@ -3149,26 +3150,9 @@
                       <a:noAutofit/>
                     </a:bodyPr>
                     <a:p>
-                      <a:pPr>
-                        <a:lnSpc>
-                          <a:spcPct val="100000"/>
-                        </a:lnSpc>
-                      </a:pPr>
                       <a:r>
-                        <a:rPr b="0" lang="en-US" sz="1800" spc="-1" strike="noStrike">
-                          <a:solidFill>
-                            <a:srgbClr val="000000"/>
-                          </a:solidFill>
-                          <a:latin typeface="Arial"/>
-                        </a:rPr>
                         <a:t>Year</a:t>
                       </a:r>
-                      <a:endParaRPr b="0" lang="en-US" sz="1800" spc="-1" strike="noStrike">
-                        <a:solidFill>
-                          <a:srgbClr val="000000"/>
-                        </a:solidFill>
-                        <a:latin typeface="Arial"/>
-                      </a:endParaRPr>
                     </a:p>
                   </a:txBody>
                   <a:tcPr anchor="t" marL="36000" marR="36000">
@@ -3205,26 +3189,9 @@
                       <a:noAutofit/>
                     </a:bodyPr>
                     <a:p>
-                      <a:pPr>
-                        <a:lnSpc>
-                          <a:spcPct val="100000"/>
-                        </a:lnSpc>
-                      </a:pPr>
                       <a:r>
-                        <a:rPr b="0" lang="en-US" sz="1800" spc="-1" strike="noStrike">
-                          <a:solidFill>
-                            <a:srgbClr val="000000"/>
-                          </a:solidFill>
-                          <a:latin typeface="Arial"/>
-                        </a:rPr>
-                        <a:t>Impressions</a:t>
+                        <a:t>Spend</a:t>
                       </a:r>
-                      <a:endParaRPr b="0" lang="en-US" sz="1800" spc="-1" strike="noStrike">
-                        <a:solidFill>
-                          <a:srgbClr val="000000"/>
-                        </a:solidFill>
-                        <a:latin typeface="Arial"/>
-                      </a:endParaRPr>
                     </a:p>
                   </a:txBody>
                   <a:tcPr anchor="t" marL="36000" marR="36000">
@@ -3261,26 +3228,9 @@
                       <a:noAutofit/>
                     </a:bodyPr>
                     <a:p>
-                      <a:pPr>
-                        <a:lnSpc>
-                          <a:spcPct val="100000"/>
-                        </a:lnSpc>
-                      </a:pPr>
                       <a:r>
-                        <a:rPr b="0" lang="en-US" sz="1800" spc="-1" strike="noStrike">
-                          <a:solidFill>
-                            <a:srgbClr val="000000"/>
-                          </a:solidFill>
-                          <a:latin typeface="Arial"/>
-                        </a:rPr>
-                        <a:t>Clicks</a:t>
+                        <a:t>Impr.</a:t>
                       </a:r>
-                      <a:endParaRPr b="0" lang="en-US" sz="1800" spc="-1" strike="noStrike">
-                        <a:solidFill>
-                          <a:srgbClr val="000000"/>
-                        </a:solidFill>
-                        <a:latin typeface="Arial"/>
-                      </a:endParaRPr>
                     </a:p>
                   </a:txBody>
                   <a:tcPr anchor="t" marL="36000" marR="36000">
@@ -3317,26 +3267,9 @@
                       <a:noAutofit/>
                     </a:bodyPr>
                     <a:p>
-                      <a:pPr>
-                        <a:lnSpc>
-                          <a:spcPct val="100000"/>
-                        </a:lnSpc>
-                      </a:pPr>
                       <a:r>
-                        <a:rPr b="0" lang="en-US" sz="1800" spc="-1" strike="noStrike">
-                          <a:solidFill>
-                            <a:srgbClr val="000000"/>
-                          </a:solidFill>
-                          <a:latin typeface="Arial"/>
-                        </a:rPr>
-                        <a:t>CTR</a:t>
+                        <a:t>Clicks</a:t>
                       </a:r>
-                      <a:endParaRPr b="0" lang="en-US" sz="1800" spc="-1" strike="noStrike">
-                        <a:solidFill>
-                          <a:srgbClr val="000000"/>
-                        </a:solidFill>
-                        <a:latin typeface="Arial"/>
-                      </a:endParaRPr>
                     </a:p>
                   </a:txBody>
                   <a:tcPr anchor="t" marL="36000" marR="36000">
@@ -3373,26 +3306,9 @@
                       <a:noAutofit/>
                     </a:bodyPr>
                     <a:p>
-                      <a:pPr>
-                        <a:lnSpc>
-                          <a:spcPct val="100000"/>
-                        </a:lnSpc>
-                      </a:pPr>
                       <a:r>
-                        <a:rPr b="0" lang="en-US" sz="1800" spc="-1" strike="noStrike">
-                          <a:solidFill>
-                            <a:srgbClr val="000000"/>
-                          </a:solidFill>
-                          <a:latin typeface="Arial"/>
-                        </a:rPr>
-                        <a:t>CPC</a:t>
+                        <a:t>CTR</a:t>
                       </a:r>
-                      <a:endParaRPr b="0" lang="en-US" sz="1800" spc="-1" strike="noStrike">
-                        <a:solidFill>
-                          <a:srgbClr val="000000"/>
-                        </a:solidFill>
-                        <a:latin typeface="Arial"/>
-                      </a:endParaRPr>
                     </a:p>
                   </a:txBody>
                   <a:tcPr anchor="t" marL="36000" marR="36000">
@@ -3429,26 +3345,9 @@
                       <a:noAutofit/>
                     </a:bodyPr>
                     <a:p>
-                      <a:pPr>
-                        <a:lnSpc>
-                          <a:spcPct val="100000"/>
-                        </a:lnSpc>
-                      </a:pPr>
                       <a:r>
-                        <a:rPr b="0" lang="en-US" sz="1800" spc="-1" strike="noStrike">
-                          <a:solidFill>
-                            <a:srgbClr val="000000"/>
-                          </a:solidFill>
-                          <a:latin typeface="Arial"/>
-                        </a:rPr>
-                        <a:t>Conversions</a:t>
+                        <a:t>CPC</a:t>
                       </a:r>
-                      <a:endParaRPr b="0" lang="en-US" sz="1800" spc="-1" strike="noStrike">
-                        <a:solidFill>
-                          <a:srgbClr val="000000"/>
-                        </a:solidFill>
-                        <a:latin typeface="Arial"/>
-                      </a:endParaRPr>
                     </a:p>
                   </a:txBody>
                   <a:tcPr anchor="t" marL="36000" marR="36000">
@@ -3485,26 +3384,48 @@
                       <a:noAutofit/>
                     </a:bodyPr>
                     <a:p>
-                      <a:pPr>
-                        <a:lnSpc>
-                          <a:spcPct val="100000"/>
-                        </a:lnSpc>
-                      </a:pPr>
                       <a:r>
-                        <a:rPr b="0" lang="en-US" sz="1800" spc="-1" strike="noStrike">
-                          <a:solidFill>
-                            <a:srgbClr val="000000"/>
-                          </a:solidFill>
-                          <a:latin typeface="Arial"/>
-                        </a:rPr>
+                        <a:t>Conversions</a:t>
+                      </a:r>
+                    </a:p>
+                  </a:txBody>
+                  <a:tcPr anchor="t" marL="36000" marR="36000">
+                    <a:lnL w="7200">
+                      <a:solidFill>
+                        <a:srgbClr val="000000"/>
+                      </a:solidFill>
+                      <a:prstDash val="solid"/>
+                    </a:lnL>
+                    <a:lnR w="7200">
+                      <a:solidFill>
+                        <a:srgbClr val="000000"/>
+                      </a:solidFill>
+                      <a:prstDash val="solid"/>
+                    </a:lnR>
+                    <a:lnT w="7200">
+                      <a:solidFill>
+                        <a:srgbClr val="000000"/>
+                      </a:solidFill>
+                      <a:prstDash val="solid"/>
+                    </a:lnT>
+                    <a:lnB w="7200">
+                      <a:solidFill>
+                        <a:srgbClr val="000000"/>
+                      </a:solidFill>
+                      <a:prstDash val="solid"/>
+                    </a:lnB>
+                    <a:noFill/>
+                  </a:tcPr>
+                </a:tc>
+                <a:tc>
+                  <a:txBody>
+                    <a:bodyPr lIns="36000" rIns="36000" anchor="t">
+                      <a:noAutofit/>
+                    </a:bodyPr>
+                    <a:p>
+                      <a:r>
                         <a:t>Conv. Rate</a:t>
                       </a:r>
-                      <a:endParaRPr b="0" lang="en-US" sz="1800" spc="-1" strike="noStrike">
-                        <a:solidFill>
-                          <a:srgbClr val="000000"/>
-                        </a:solidFill>
-                        <a:latin typeface="Arial"/>
-                      </a:endParaRPr>
                     </a:p>
                   </a:txBody>
                   <a:tcPr anchor="t" marL="36000" marR="36000">
@@ -3543,26 +3464,9 @@
                       <a:noAutofit/>
                     </a:bodyPr>
                     <a:p>
-                      <a:pPr>
-                        <a:lnSpc>
-                          <a:spcPct val="100000"/>
-                        </a:lnSpc>
-                      </a:pPr>
                       <a:r>
-                        <a:rPr b="0" lang="en-US" sz="1800" spc="-1" strike="noStrike">
-                          <a:solidFill>
-                            <a:srgbClr val="000000"/>
-                          </a:solidFill>
-                          <a:latin typeface="Arial"/>
-                        </a:rPr>
                         <a:t>2024</a:t>
                       </a:r>
-                      <a:endParaRPr b="0" lang="en-US" sz="1800" spc="-1" strike="noStrike">
-                        <a:solidFill>
-                          <a:srgbClr val="000000"/>
-                        </a:solidFill>
-                        <a:latin typeface="Arial"/>
-                      </a:endParaRPr>
                     </a:p>
                   </a:txBody>
                   <a:tcPr anchor="t" marL="36000" marR="36000">
@@ -3599,26 +3503,9 @@
                       <a:noAutofit/>
                     </a:bodyPr>
                     <a:p>
-                      <a:pPr>
-                        <a:lnSpc>
-                          <a:spcPct val="100000"/>
-                        </a:lnSpc>
-                      </a:pPr>
                       <a:r>
-                        <a:rPr b="0" lang="en-US" sz="1800" spc="-1" strike="noStrike">
-                          <a:solidFill>
-                            <a:srgbClr val="000000"/>
-                          </a:solidFill>
-                          <a:latin typeface="Arial"/>
-                        </a:rPr>
-                        <a:t>1031778000.0</a:t>
+                        <a:t>$25.0k</a:t>
                       </a:r>
-                      <a:endParaRPr b="0" lang="en-US" sz="1800" spc="-1" strike="noStrike">
-                        <a:solidFill>
-                          <a:srgbClr val="000000"/>
-                        </a:solidFill>
-                        <a:latin typeface="Arial"/>
-                      </a:endParaRPr>
                     </a:p>
                   </a:txBody>
                   <a:tcPr anchor="t" marL="36000" marR="36000">
@@ -3655,26 +3542,9 @@
                       <a:noAutofit/>
                     </a:bodyPr>
                     <a:p>
-                      <a:pPr>
-                        <a:lnSpc>
-                          <a:spcPct val="100000"/>
-                        </a:lnSpc>
-                      </a:pPr>
                       <a:r>
-                        <a:rPr b="0" lang="en-US" sz="1800" spc="-1" strike="noStrike">
-                          <a:solidFill>
-                            <a:srgbClr val="000000"/>
-                          </a:solidFill>
-                          <a:latin typeface="Arial"/>
-                        </a:rPr>
-                        <a:t>127889599.0</a:t>
+                        <a:t>1031.78M</a:t>
                       </a:r>
-                      <a:endParaRPr b="0" lang="en-US" sz="1800" spc="-1" strike="noStrike">
-                        <a:solidFill>
-                          <a:srgbClr val="000000"/>
-                        </a:solidFill>
-                        <a:latin typeface="Arial"/>
-                      </a:endParaRPr>
                     </a:p>
                   </a:txBody>
                   <a:tcPr anchor="t" marL="36000" marR="36000">
@@ -3711,26 +3581,9 @@
                       <a:noAutofit/>
                     </a:bodyPr>
                     <a:p>
-                      <a:pPr>
-                        <a:lnSpc>
-                          <a:spcPct val="100000"/>
-                        </a:lnSpc>
-                      </a:pPr>
                       <a:r>
-                        <a:rPr b="0" lang="en-US" sz="1800" spc="-1" strike="noStrike">
-                          <a:solidFill>
-                            <a:srgbClr val="000000"/>
-                          </a:solidFill>
-                          <a:latin typeface="Arial"/>
-                        </a:rPr>
-                        <a:t>0.123950693850809</a:t>
+                        <a:t>127.89M</a:t>
                       </a:r>
-                      <a:endParaRPr b="0" lang="en-US" sz="1800" spc="-1" strike="noStrike">
-                        <a:solidFill>
-                          <a:srgbClr val="000000"/>
-                        </a:solidFill>
-                        <a:latin typeface="Arial"/>
-                      </a:endParaRPr>
                     </a:p>
                   </a:txBody>
                   <a:tcPr anchor="t" marL="36000" marR="36000">
@@ -3767,26 +3620,9 @@
                       <a:noAutofit/>
                     </a:bodyPr>
                     <a:p>
-                      <a:pPr>
-                        <a:lnSpc>
-                          <a:spcPct val="100000"/>
-                        </a:lnSpc>
-                      </a:pPr>
                       <a:r>
-                        <a:rPr b="0" lang="en-US" sz="1800" spc="-1" strike="noStrike">
-                          <a:solidFill>
-                            <a:srgbClr val="000000"/>
-                          </a:solidFill>
-                          <a:latin typeface="Arial"/>
-                        </a:rPr>
-                        <a:t>0.0001954811039481</a:t>
+                        <a:t>0.12%</a:t>
                       </a:r>
-                      <a:endParaRPr b="0" lang="en-US" sz="1800" spc="-1" strike="noStrike">
-                        <a:solidFill>
-                          <a:srgbClr val="000000"/>
-                        </a:solidFill>
-                        <a:latin typeface="Arial"/>
-                      </a:endParaRPr>
                     </a:p>
                   </a:txBody>
                   <a:tcPr anchor="t" marL="36000" marR="36000">
@@ -3823,26 +3659,9 @@
                       <a:noAutofit/>
                     </a:bodyPr>
                     <a:p>
-                      <a:pPr>
-                        <a:lnSpc>
-                          <a:spcPct val="100000"/>
-                        </a:lnSpc>
-                      </a:pPr>
                       <a:r>
-                        <a:rPr b="0" lang="en-US" sz="1800" spc="-1" strike="noStrike">
-                          <a:solidFill>
-                            <a:srgbClr val="000000"/>
-                          </a:solidFill>
-                          <a:latin typeface="Arial"/>
-                        </a:rPr>
-                        <a:t>16609671.7091</a:t>
+                        <a:t>$0.0002</a:t>
                       </a:r>
-                      <a:endParaRPr b="0" lang="en-US" sz="1800" spc="-1" strike="noStrike">
-                        <a:solidFill>
-                          <a:srgbClr val="000000"/>
-                        </a:solidFill>
-                        <a:latin typeface="Arial"/>
-                      </a:endParaRPr>
                     </a:p>
                   </a:txBody>
                   <a:tcPr anchor="t" marL="36000" marR="36000">
@@ -3879,26 +3698,48 @@
                       <a:noAutofit/>
                     </a:bodyPr>
                     <a:p>
-                      <a:pPr>
-                        <a:lnSpc>
-                          <a:spcPct val="100000"/>
-                        </a:lnSpc>
-                      </a:pPr>
                       <a:r>
-                        <a:rPr b="0" lang="en-US" sz="1800" spc="-1" strike="noStrike">
-                          <a:solidFill>
-                            <a:srgbClr val="000000"/>
-                          </a:solidFill>
-                          <a:latin typeface="Arial"/>
-                        </a:rPr>
-                        <a:t>0.1298750784971966</a:t>
+                        <a:t>16.61M</a:t>
                       </a:r>
-                      <a:endParaRPr b="0" lang="en-US" sz="1800" spc="-1" strike="noStrike">
-                        <a:solidFill>
-                          <a:srgbClr val="000000"/>
-                        </a:solidFill>
-                        <a:latin typeface="Arial"/>
-                      </a:endParaRPr>
+                    </a:p>
+                  </a:txBody>
+                  <a:tcPr anchor="t" marL="36000" marR="36000">
+                    <a:lnL w="7200">
+                      <a:solidFill>
+                        <a:srgbClr val="000000"/>
+                      </a:solidFill>
+                      <a:prstDash val="solid"/>
+                    </a:lnL>
+                    <a:lnR w="7200">
+                      <a:solidFill>
+                        <a:srgbClr val="000000"/>
+                      </a:solidFill>
+                      <a:prstDash val="solid"/>
+                    </a:lnR>
+                    <a:lnT w="7200">
+                      <a:solidFill>
+                        <a:srgbClr val="000000"/>
+                      </a:solidFill>
+                      <a:prstDash val="solid"/>
+                    </a:lnT>
+                    <a:lnB w="7200">
+                      <a:solidFill>
+                        <a:srgbClr val="000000"/>
+                      </a:solidFill>
+                      <a:prstDash val="solid"/>
+                    </a:lnB>
+                    <a:noFill/>
+                  </a:tcPr>
+                </a:tc>
+                <a:tc>
+                  <a:txBody>
+                    <a:bodyPr lIns="36000" rIns="36000" anchor="t">
+                      <a:noAutofit/>
+                    </a:bodyPr>
+                    <a:p>
+                      <a:r>
+                        <a:t>0.13%</a:t>
+                      </a:r>
                     </a:p>
                   </a:txBody>
                   <a:tcPr anchor="t" marL="36000" marR="36000">
@@ -3937,26 +3778,9 @@
                       <a:noAutofit/>
                     </a:bodyPr>
                     <a:p>
-                      <a:pPr>
-                        <a:lnSpc>
-                          <a:spcPct val="100000"/>
-                        </a:lnSpc>
-                      </a:pPr>
                       <a:r>
-                        <a:rPr b="0" lang="en-US" sz="1800" spc="-1" strike="noStrike">
-                          <a:solidFill>
-                            <a:srgbClr val="000000"/>
-                          </a:solidFill>
-                          <a:latin typeface="Arial"/>
-                        </a:rPr>
                         <a:t>2023</a:t>
                       </a:r>
-                      <a:endParaRPr b="0" lang="en-US" sz="1800" spc="-1" strike="noStrike">
-                        <a:solidFill>
-                          <a:srgbClr val="000000"/>
-                        </a:solidFill>
-                        <a:latin typeface="Arial"/>
-                      </a:endParaRPr>
                     </a:p>
                   </a:txBody>
                   <a:tcPr anchor="t" marL="36000" marR="36000">
@@ -3993,26 +3817,9 @@
                       <a:noAutofit/>
                     </a:bodyPr>
                     <a:p>
-                      <a:pPr>
-                        <a:lnSpc>
-                          <a:spcPct val="100000"/>
-                        </a:lnSpc>
-                      </a:pPr>
                       <a:r>
-                        <a:rPr b="0" lang="en-US" sz="1800" spc="-1" strike="noStrike">
-                          <a:solidFill>
-                            <a:srgbClr val="000000"/>
-                          </a:solidFill>
-                          <a:latin typeface="Arial"/>
-                        </a:rPr>
-                        <a:t>985011000.0</a:t>
+                        <a:t>$25.0k</a:t>
                       </a:r>
-                      <a:endParaRPr b="0" lang="en-US" sz="1800" spc="-1" strike="noStrike">
-                        <a:solidFill>
-                          <a:srgbClr val="000000"/>
-                        </a:solidFill>
-                        <a:latin typeface="Arial"/>
-                      </a:endParaRPr>
                     </a:p>
                   </a:txBody>
                   <a:tcPr anchor="t" marL="36000" marR="36000">
@@ -4049,26 +3856,9 @@
                       <a:noAutofit/>
                     </a:bodyPr>
                     <a:p>
-                      <a:pPr>
-                        <a:lnSpc>
-                          <a:spcPct val="100000"/>
-                        </a:lnSpc>
-                      </a:pPr>
                       <a:r>
-                        <a:rPr b="0" lang="en-US" sz="1800" spc="-1" strike="noStrike">
-                          <a:solidFill>
-                            <a:srgbClr val="000000"/>
-                          </a:solidFill>
-                          <a:latin typeface="Arial"/>
-                        </a:rPr>
-                        <a:t>100783000.0</a:t>
+                        <a:t>985.01M</a:t>
                       </a:r>
-                      <a:endParaRPr b="0" lang="en-US" sz="1800" spc="-1" strike="noStrike">
-                        <a:solidFill>
-                          <a:srgbClr val="000000"/>
-                        </a:solidFill>
-                        <a:latin typeface="Arial"/>
-                      </a:endParaRPr>
                     </a:p>
                   </a:txBody>
                   <a:tcPr anchor="t" marL="36000" marR="36000">
@@ -4105,26 +3895,9 @@
                       <a:noAutofit/>
                     </a:bodyPr>
                     <a:p>
-                      <a:pPr>
-                        <a:lnSpc>
-                          <a:spcPct val="100000"/>
-                        </a:lnSpc>
-                      </a:pPr>
                       <a:r>
-                        <a:rPr b="0" lang="en-US" sz="1800" spc="-1" strike="noStrike">
-                          <a:solidFill>
-                            <a:srgbClr val="000000"/>
-                          </a:solidFill>
-                          <a:latin typeface="Arial"/>
-                        </a:rPr>
-                        <a:t>0.1023166238752663</a:t>
+                        <a:t>100.78M</a:t>
                       </a:r>
-                      <a:endParaRPr b="0" lang="en-US" sz="1800" spc="-1" strike="noStrike">
-                        <a:solidFill>
-                          <a:srgbClr val="000000"/>
-                        </a:solidFill>
-                        <a:latin typeface="Arial"/>
-                      </a:endParaRPr>
                     </a:p>
                   </a:txBody>
                   <a:tcPr anchor="t" marL="36000" marR="36000">
@@ -4161,26 +3934,9 @@
                       <a:noAutofit/>
                     </a:bodyPr>
                     <a:p>
-                      <a:pPr>
-                        <a:lnSpc>
-                          <a:spcPct val="100000"/>
-                        </a:lnSpc>
-                      </a:pPr>
                       <a:r>
-                        <a:rPr b="0" lang="en-US" sz="1800" spc="-1" strike="noStrike">
-                          <a:solidFill>
-                            <a:srgbClr val="000000"/>
-                          </a:solidFill>
-                          <a:latin typeface="Arial"/>
-                        </a:rPr>
-                        <a:t>0.0002480577081055</a:t>
+                        <a:t>0.1%</a:t>
                       </a:r>
-                      <a:endParaRPr b="0" lang="en-US" sz="1800" spc="-1" strike="noStrike">
-                        <a:solidFill>
-                          <a:srgbClr val="000000"/>
-                        </a:solidFill>
-                        <a:latin typeface="Arial"/>
-                      </a:endParaRPr>
                     </a:p>
                   </a:txBody>
                   <a:tcPr anchor="t" marL="36000" marR="36000">
@@ -4217,26 +3973,9 @@
                       <a:noAutofit/>
                     </a:bodyPr>
                     <a:p>
-                      <a:pPr>
-                        <a:lnSpc>
-                          <a:spcPct val="100000"/>
-                        </a:lnSpc>
-                      </a:pPr>
                       <a:r>
-                        <a:rPr b="0" lang="en-US" sz="1800" spc="-1" strike="noStrike">
-                          <a:solidFill>
-                            <a:srgbClr val="000000"/>
-                          </a:solidFill>
-                          <a:latin typeface="Arial"/>
-                        </a:rPr>
-                        <a:t>13918744.010000002</a:t>
+                        <a:t>$0.00025</a:t>
                       </a:r>
-                      <a:endParaRPr b="0" lang="en-US" sz="1800" spc="-1" strike="noStrike">
-                        <a:solidFill>
-                          <a:srgbClr val="000000"/>
-                        </a:solidFill>
-                        <a:latin typeface="Arial"/>
-                      </a:endParaRPr>
                     </a:p>
                   </a:txBody>
                   <a:tcPr anchor="t" marL="36000" marR="36000">
@@ -4273,26 +4012,48 @@
                       <a:noAutofit/>
                     </a:bodyPr>
                     <a:p>
-                      <a:pPr>
-                        <a:lnSpc>
-                          <a:spcPct val="100000"/>
-                        </a:lnSpc>
-                      </a:pPr>
                       <a:r>
-                        <a:rPr b="0" lang="en-US" sz="1800" spc="-1" strike="noStrike">
-                          <a:solidFill>
-                            <a:srgbClr val="000000"/>
-                          </a:solidFill>
-                          <a:latin typeface="Arial"/>
-                        </a:rPr>
-                        <a:t>0.138106069575226</a:t>
+                        <a:t>13.92M</a:t>
                       </a:r>
-                      <a:endParaRPr b="0" lang="en-US" sz="1800" spc="-1" strike="noStrike">
-                        <a:solidFill>
-                          <a:srgbClr val="000000"/>
-                        </a:solidFill>
-                        <a:latin typeface="Arial"/>
-                      </a:endParaRPr>
+                    </a:p>
+                  </a:txBody>
+                  <a:tcPr anchor="t" marL="36000" marR="36000">
+                    <a:lnL w="7200">
+                      <a:solidFill>
+                        <a:srgbClr val="000000"/>
+                      </a:solidFill>
+                      <a:prstDash val="solid"/>
+                    </a:lnL>
+                    <a:lnR w="7200">
+                      <a:solidFill>
+                        <a:srgbClr val="000000"/>
+                      </a:solidFill>
+                      <a:prstDash val="solid"/>
+                    </a:lnR>
+                    <a:lnT w="7200">
+                      <a:solidFill>
+                        <a:srgbClr val="000000"/>
+                      </a:solidFill>
+                      <a:prstDash val="solid"/>
+                    </a:lnT>
+                    <a:lnB w="7200">
+                      <a:solidFill>
+                        <a:srgbClr val="000000"/>
+                      </a:solidFill>
+                      <a:prstDash val="solid"/>
+                    </a:lnB>
+                    <a:noFill/>
+                  </a:tcPr>
+                </a:tc>
+                <a:tc>
+                  <a:txBody>
+                    <a:bodyPr lIns="36000" rIns="36000" anchor="t">
+                      <a:noAutofit/>
+                    </a:bodyPr>
+                    <a:p>
+                      <a:r>
+                        <a:t>0.14%</a:t>
+                      </a:r>
                     </a:p>
                   </a:txBody>
                   <a:tcPr anchor="t" marL="36000" marR="36000">
@@ -4331,20 +4092,45 @@
                       <a:noAutofit/>
                     </a:bodyPr>
                     <a:p>
-                      <a:pPr>
-                        <a:lnSpc>
-                          <a:spcPct val="100000"/>
-                        </a:lnSpc>
-                      </a:pPr>
                       <a:r>
-                        <a:rPr b="0" lang="en-US" sz="1800" spc="-1" strike="noStrike">
-                          <a:solidFill>
-                            <a:srgbClr val="000000"/>
-                          </a:solidFill>
-                          <a:latin typeface="Arial"/>
-                        </a:rPr>
                         <a:t>YoY</a:t>
                       </a:r>
+                    </a:p>
+                  </a:txBody>
+                  <a:tcPr anchor="t" marL="36000" marR="36000">
+                    <a:lnL w="7200">
+                      <a:solidFill>
+                        <a:srgbClr val="000000"/>
+                      </a:solidFill>
+                      <a:prstDash val="solid"/>
+                    </a:lnL>
+                    <a:lnR w="7200">
+                      <a:solidFill>
+                        <a:srgbClr val="000000"/>
+                      </a:solidFill>
+                      <a:prstDash val="solid"/>
+                    </a:lnR>
+                    <a:lnT w="7200">
+                      <a:solidFill>
+                        <a:srgbClr val="000000"/>
+                      </a:solidFill>
+                      <a:prstDash val="solid"/>
+                    </a:lnT>
+                    <a:lnB w="7200">
+                      <a:solidFill>
+                        <a:srgbClr val="000000"/>
+                      </a:solidFill>
+                      <a:prstDash val="solid"/>
+                    </a:lnB>
+                    <a:noFill/>
+                  </a:tcPr>
+                </a:tc>
+                <a:tc>
+                  <a:txBody>
+                    <a:bodyPr lIns="36000" rIns="36000" anchor="t">
+                      <a:noAutofit/>
+                    </a:bodyPr>
+                    <a:p>
                       <a:endParaRPr b="0" lang="en-US" sz="1800" spc="-1" strike="noStrike">
                         <a:solidFill>
                           <a:srgbClr val="000000"/>
@@ -4387,11 +4173,6 @@
                       <a:noAutofit/>
                     </a:bodyPr>
                     <a:p>
-                      <a:pPr>
-                        <a:lnSpc>
-                          <a:spcPct val="100000"/>
-                        </a:lnSpc>
-                      </a:pPr>
                       <a:endParaRPr b="0" lang="en-US" sz="1800" spc="-1" strike="noStrike">
                         <a:solidFill>
                           <a:srgbClr val="000000"/>
@@ -4434,11 +4215,6 @@
                       <a:noAutofit/>
                     </a:bodyPr>
                     <a:p>
-                      <a:pPr>
-                        <a:lnSpc>
-                          <a:spcPct val="100000"/>
-                        </a:lnSpc>
-                      </a:pPr>
                       <a:endParaRPr b="0" lang="en-US" sz="1800" spc="-1" strike="noStrike">
                         <a:solidFill>
                           <a:srgbClr val="000000"/>
@@ -4481,11 +4257,6 @@
                       <a:noAutofit/>
                     </a:bodyPr>
                     <a:p>
-                      <a:pPr>
-                        <a:lnSpc>
-                          <a:spcPct val="100000"/>
-                        </a:lnSpc>
-                      </a:pPr>
                       <a:endParaRPr b="0" lang="en-US" sz="1800" spc="-1" strike="noStrike">
                         <a:solidFill>
                           <a:srgbClr val="000000"/>
@@ -4528,11 +4299,6 @@
                       <a:noAutofit/>
                     </a:bodyPr>
                     <a:p>
-                      <a:pPr>
-                        <a:lnSpc>
-                          <a:spcPct val="100000"/>
-                        </a:lnSpc>
-                      </a:pPr>
                       <a:endParaRPr b="0" lang="en-US" sz="1800" spc="-1" strike="noStrike">
                         <a:solidFill>
                           <a:srgbClr val="000000"/>
@@ -4575,11 +4341,6 @@
                       <a:noAutofit/>
                     </a:bodyPr>
                     <a:p>
-                      <a:pPr>
-                        <a:lnSpc>
-                          <a:spcPct val="100000"/>
-                        </a:lnSpc>
-                      </a:pPr>
                       <a:endParaRPr b="0" lang="en-US" sz="1800" spc="-1" strike="noStrike">
                         <a:solidFill>
                           <a:srgbClr val="000000"/>
@@ -4622,11 +4383,6 @@
                       <a:noAutofit/>
                     </a:bodyPr>
                     <a:p>
-                      <a:pPr>
-                        <a:lnSpc>
-                          <a:spcPct val="100000"/>
-                        </a:lnSpc>
-                      </a:pPr>
                       <a:endParaRPr b="0" lang="en-US" sz="1800" spc="-1" strike="noStrike">
                         <a:solidFill>
                           <a:srgbClr val="000000"/>
@@ -4671,11 +4427,6 @@
                       <a:noAutofit/>
                     </a:bodyPr>
                     <a:p>
-                      <a:pPr>
-                        <a:lnSpc>
-                          <a:spcPct val="100000"/>
-                        </a:lnSpc>
-                      </a:pPr>
                       <a:endParaRPr b="0" lang="en-US" sz="1800" spc="-1" strike="noStrike">
                         <a:solidFill>
                           <a:srgbClr val="000000"/>
@@ -4718,11 +4469,6 @@
                       <a:noAutofit/>
                     </a:bodyPr>
                     <a:p>
-                      <a:pPr>
-                        <a:lnSpc>
-                          <a:spcPct val="100000"/>
-                        </a:lnSpc>
-                      </a:pPr>
                       <a:endParaRPr b="0" lang="en-US" sz="1800" spc="-1" strike="noStrike">
                         <a:solidFill>
                           <a:srgbClr val="000000"/>
@@ -4765,11 +4511,6 @@
                       <a:noAutofit/>
                     </a:bodyPr>
                     <a:p>
-                      <a:pPr>
-                        <a:lnSpc>
-                          <a:spcPct val="100000"/>
-                        </a:lnSpc>
-                      </a:pPr>
                       <a:endParaRPr b="0" lang="en-US" sz="1800" spc="-1" strike="noStrike">
                         <a:solidFill>
                           <a:srgbClr val="000000"/>
@@ -4812,11 +4553,6 @@
                       <a:noAutofit/>
                     </a:bodyPr>
                     <a:p>
-                      <a:pPr>
-                        <a:lnSpc>
-                          <a:spcPct val="100000"/>
-                        </a:lnSpc>
-                      </a:pPr>
                       <a:endParaRPr b="0" lang="en-US" sz="1800" spc="-1" strike="noStrike">
                         <a:solidFill>
                           <a:srgbClr val="000000"/>
@@ -4859,11 +4595,6 @@
                       <a:noAutofit/>
                     </a:bodyPr>
                     <a:p>
-                      <a:pPr>
-                        <a:lnSpc>
-                          <a:spcPct val="100000"/>
-                        </a:lnSpc>
-                      </a:pPr>
                       <a:endParaRPr b="0" lang="en-US" sz="1800" spc="-1" strike="noStrike">
                         <a:solidFill>
                           <a:srgbClr val="000000"/>
@@ -4906,11 +4637,6 @@
                       <a:noAutofit/>
                     </a:bodyPr>
                     <a:p>
-                      <a:pPr>
-                        <a:lnSpc>
-                          <a:spcPct val="100000"/>
-                        </a:lnSpc>
-                      </a:pPr>
                       <a:endParaRPr b="0" lang="en-US" sz="1800" spc="-1" strike="noStrike">
                         <a:solidFill>
                           <a:srgbClr val="000000"/>
@@ -4953,11 +4679,48 @@
                       <a:noAutofit/>
                     </a:bodyPr>
                     <a:p>
-                      <a:pPr>
-                        <a:lnSpc>
-                          <a:spcPct val="100000"/>
-                        </a:lnSpc>
-                      </a:pPr>
+                      <a:endParaRPr b="0" lang="en-US" sz="1800" spc="-1" strike="noStrike">
+                        <a:solidFill>
+                          <a:srgbClr val="000000"/>
+                        </a:solidFill>
+                        <a:latin typeface="Arial"/>
+                      </a:endParaRPr>
+                    </a:p>
+                  </a:txBody>
+                  <a:tcPr anchor="t" marL="36000" marR="36000">
+                    <a:lnL w="7200">
+                      <a:solidFill>
+                        <a:srgbClr val="000000"/>
+                      </a:solidFill>
+                      <a:prstDash val="solid"/>
+                    </a:lnL>
+                    <a:lnR w="7200">
+                      <a:solidFill>
+                        <a:srgbClr val="000000"/>
+                      </a:solidFill>
+                      <a:prstDash val="solid"/>
+                    </a:lnR>
+                    <a:lnT w="7200">
+                      <a:solidFill>
+                        <a:srgbClr val="000000"/>
+                      </a:solidFill>
+                      <a:prstDash val="solid"/>
+                    </a:lnT>
+                    <a:lnB w="7200">
+                      <a:solidFill>
+                        <a:srgbClr val="000000"/>
+                      </a:solidFill>
+                      <a:prstDash val="solid"/>
+                    </a:lnB>
+                    <a:noFill/>
+                  </a:tcPr>
+                </a:tc>
+                <a:tc>
+                  <a:txBody>
+                    <a:bodyPr lIns="36000" rIns="36000" anchor="t">
+                      <a:noAutofit/>
+                    </a:bodyPr>
+                    <a:p>
                       <a:endParaRPr b="0" lang="en-US" sz="1800" spc="-1" strike="noStrike">
                         <a:solidFill>
                           <a:srgbClr val="000000"/>

</xml_diff>

<commit_message>
Data Synthesizer tweaks, added easy data selection controls at the top, imported LLM response to analysis_generator.py
</commit_message>
<xml_diff>
--- a/pull_test.pptx
+++ b/pull_test.pptx
@@ -69,7 +69,7 @@
         <p:txBody>
           <a:bodyPr/>
           <a:p>
-            <a:fld id="{1448D755-A7EB-462D-9233-A4D29380605B}" type="slidenum">
+            <a:fld id="{BD6C315C-8606-4592-88A5-FC4E699CBA9B}" type="slidenum">
               <a:t>&lt;#&gt;</a:t>
             </a:fld>
           </a:p>
@@ -232,7 +232,7 @@
         <p:txBody>
           <a:bodyPr/>
           <a:p>
-            <a:fld id="{E10FA086-BB6A-4A5E-A55C-14E8F3484E64}" type="slidenum">
+            <a:fld id="{7BD55E3C-881B-4602-B6CA-52C8FF410E7F}" type="slidenum">
               <a:t>&lt;#&gt;</a:t>
             </a:fld>
           </a:p>
@@ -398,7 +398,7 @@
         <p:txBody>
           <a:bodyPr/>
           <a:p>
-            <a:fld id="{9CB434BE-90BA-4579-BD61-1FF0EEBF361D}" type="slidenum">
+            <a:fld id="{99A1E8E0-2ED9-4B66-9E9F-12C6A695B736}" type="slidenum">
               <a:t>&lt;#&gt;</a:t>
             </a:fld>
           </a:p>
@@ -481,7 +481,7 @@
         <p:txBody>
           <a:bodyPr/>
           <a:p>
-            <a:fld id="{16685791-4374-4D79-A19F-1E0345F07327}" type="slidenum">
+            <a:fld id="{1C04AA1F-B7C7-4525-9C6F-AD8CBA197F8A}" type="slidenum">
               <a:t>&lt;#&gt;</a:t>
             </a:fld>
           </a:p>
@@ -564,7 +564,7 @@
         <p:txBody>
           <a:bodyPr/>
           <a:p>
-            <a:fld id="{DDE6C558-CFE1-4156-9AA6-479533D27860}" type="slidenum">
+            <a:fld id="{0DD8FAC6-815D-4A99-8409-2D085D997860}" type="slidenum">
               <a:t>&lt;#&gt;</a:t>
             </a:fld>
           </a:p>
@@ -733,7 +733,7 @@
                 </a:solidFill>
                 <a:latin typeface="Source Sans Pro"/>
               </a:rPr>
-              <a:t> </a:t>
+              <a:t>&lt;footer&gt;</a:t>
             </a:r>
             <a:endParaRPr b="0" lang="en-US" sz="2400" spc="-1" strike="noStrike">
               <a:solidFill>
@@ -800,14 +800,14 @@
                 <a:tab algn="l" pos="0"/>
               </a:tabLst>
             </a:pPr>
-            <a:fld id="{4C425D0F-42E7-410D-AE5C-D1607603740C}" type="slidenum">
+            <a:fld id="{76A8C248-56F8-4847-A1D7-DD5DD69983D2}" type="slidenum">
               <a:rPr b="0" lang="en-US" sz="2400" spc="-1" strike="noStrike">
                 <a:solidFill>
                   <a:srgbClr val="dbf5f9"/>
                 </a:solidFill>
                 <a:latin typeface="Source Sans Pro"/>
               </a:rPr>
-              <a:t>2</a:t>
+              <a:t>&lt;number&gt;</a:t>
             </a:fld>
             <a:endParaRPr b="0" lang="en-US" sz="2400" spc="-1" strike="noStrike">
               <a:solidFill>
@@ -869,7 +869,7 @@
                 </a:solidFill>
                 <a:latin typeface="Times New Roman"/>
               </a:rPr>
-              <a:t> </a:t>
+              <a:t>&lt;date/time&gt;</a:t>
             </a:r>
             <a:endParaRPr b="0" lang="en-US" sz="1400" spc="-1" strike="noStrike">
               <a:solidFill>
@@ -1142,7 +1142,7 @@
                 <a:tab algn="l" pos="0"/>
               </a:tabLst>
             </a:pPr>
-            <a:fld id="{83B5126E-4C4C-445D-ACC6-8D597DF595A0}" type="slidenum">
+            <a:fld id="{CF0F1C6C-6EAA-46A6-B2FF-14C6D2AA178F}" type="slidenum">
               <a:rPr b="0" lang="en-US" sz="2400" spc="-1" strike="noStrike">
                 <a:solidFill>
                   <a:srgbClr val="dbf5f9"/>
@@ -1930,7 +1930,7 @@
                 <a:tab algn="l" pos="0"/>
               </a:tabLst>
             </a:pPr>
-            <a:fld id="{CFD0BE14-9CE8-4B99-B18C-A199BBF16091}" type="slidenum">
+            <a:fld id="{18051325-74D1-4719-BCE3-25FA1A1DC687}" type="slidenum">
               <a:rPr b="0" lang="en-US" sz="2400" spc="-1" strike="noStrike">
                 <a:solidFill>
                   <a:srgbClr val="484848"/>
@@ -2217,7 +2217,7 @@
                 <a:tab algn="l" pos="0"/>
               </a:tabLst>
             </a:pPr>
-            <a:fld id="{F2EC1D60-B485-4DD0-9594-750803006540}" type="slidenum">
+            <a:fld id="{656C185B-081E-4B9D-9E6D-41E1BF938110}" type="slidenum">
               <a:rPr b="0" lang="en-US" sz="2400" spc="-1" strike="noStrike">
                 <a:solidFill>
                   <a:srgbClr val="484848"/>
@@ -2561,7 +2561,7 @@
                 <a:tab algn="l" pos="0"/>
               </a:tabLst>
             </a:pPr>
-            <a:fld id="{E9B81675-B75C-4E0F-9996-D3AC632F9704}" type="slidenum">
+            <a:fld id="{6FAE6C48-0C1B-46B7-85FD-1C89947FBA87}" type="slidenum">
               <a:rPr b="0" lang="en-US" sz="2400" spc="-1" strike="noStrike">
                 <a:solidFill>
                   <a:srgbClr val="484848"/>
@@ -3126,7 +3126,7 @@
           <p:nvPr/>
         </p:nvGraphicFramePr>
         <p:xfrm>
-          <a:off x="237960" y="1687680"/>
+          <a:off x="577080" y="1166400"/>
           <a:ext cx="12630960" cy="1924200"/>
         </p:xfrm>
         <a:graphic>
@@ -3134,14 +3134,14 @@
             <a:tbl>
               <a:tblPr/>
               <a:tblGrid>
-                <a:gridCol w="1804320"/>
-                <a:gridCol w="1804320"/>
-                <a:gridCol w="1804320"/>
-                <a:gridCol w="1804320"/>
-                <a:gridCol w="1804320"/>
-                <a:gridCol w="1804680"/>
-                <a:gridCol w="1804680"/>
-                <a:gridCol w="1804680"/>
+                <a:gridCol w="988200"/>
+                <a:gridCol w="788400"/>
+                <a:gridCol w="722520"/>
+                <a:gridCol w="897840"/>
+                <a:gridCol w="996480"/>
+                <a:gridCol w="919440"/>
+                <a:gridCol w="1379520"/>
+                <a:gridCol w="1379880"/>
               </a:tblGrid>
               <a:tr h="384840">
                 <a:tc>
@@ -3738,7 +3738,7 @@
                     </a:bodyPr>
                     <a:p>
                       <a:r>
-                        <a:t>0.13%</a:t>
+                        <a:t>0.13</a:t>
                       </a:r>
                     </a:p>
                   </a:txBody>
@@ -4052,7 +4052,7 @@
                     </a:bodyPr>
                     <a:p>
                       <a:r>
-                        <a:t>0.14%</a:t>
+                        <a:t>0.14</a:t>
                       </a:r>
                     </a:p>
                   </a:txBody>
@@ -4131,12 +4131,9 @@
                       <a:noAutofit/>
                     </a:bodyPr>
                     <a:p>
-                      <a:endParaRPr b="0" lang="en-US" sz="1800" spc="-1" strike="noStrike">
-                        <a:solidFill>
-                          <a:srgbClr val="000000"/>
-                        </a:solidFill>
-                        <a:latin typeface="Arial"/>
-                      </a:endParaRPr>
+                      <a:r>
+                        <a:t>0.0%</a:t>
+                      </a:r>
                     </a:p>
                   </a:txBody>
                   <a:tcPr anchor="t" marL="36000" marR="36000">
@@ -4173,12 +4170,9 @@
                       <a:noAutofit/>
                     </a:bodyPr>
                     <a:p>
-                      <a:endParaRPr b="0" lang="en-US" sz="1800" spc="-1" strike="noStrike">
-                        <a:solidFill>
-                          <a:srgbClr val="000000"/>
-                        </a:solidFill>
-                        <a:latin typeface="Arial"/>
-                      </a:endParaRPr>
+                      <a:r>
+                        <a:t>4.75%</a:t>
+                      </a:r>
                     </a:p>
                   </a:txBody>
                   <a:tcPr anchor="t" marL="36000" marR="36000">
@@ -4215,12 +4209,9 @@
                       <a:noAutofit/>
                     </a:bodyPr>
                     <a:p>
-                      <a:endParaRPr b="0" lang="en-US" sz="1800" spc="-1" strike="noStrike">
-                        <a:solidFill>
-                          <a:srgbClr val="000000"/>
-                        </a:solidFill>
-                        <a:latin typeface="Arial"/>
-                      </a:endParaRPr>
+                      <a:r>
+                        <a:t>26.9%</a:t>
+                      </a:r>
                     </a:p>
                   </a:txBody>
                   <a:tcPr anchor="t" marL="36000" marR="36000">
@@ -4257,12 +4248,9 @@
                       <a:noAutofit/>
                     </a:bodyPr>
                     <a:p>
-                      <a:endParaRPr b="0" lang="en-US" sz="1800" spc="-1" strike="noStrike">
-                        <a:solidFill>
-                          <a:srgbClr val="000000"/>
-                        </a:solidFill>
-                        <a:latin typeface="Arial"/>
-                      </a:endParaRPr>
+                      <a:r>
+                        <a:t>21.14%</a:t>
+                      </a:r>
                     </a:p>
                   </a:txBody>
                   <a:tcPr anchor="t" marL="36000" marR="36000">
@@ -4299,12 +4287,9 @@
                       <a:noAutofit/>
                     </a:bodyPr>
                     <a:p>
-                      <a:endParaRPr b="0" lang="en-US" sz="1800" spc="-1" strike="noStrike">
-                        <a:solidFill>
-                          <a:srgbClr val="000000"/>
-                        </a:solidFill>
-                        <a:latin typeface="Arial"/>
-                      </a:endParaRPr>
+                      <a:r>
+                        <a:t>-21.2%</a:t>
+                      </a:r>
                     </a:p>
                   </a:txBody>
                   <a:tcPr anchor="t" marL="36000" marR="36000">
@@ -4341,12 +4326,9 @@
                       <a:noAutofit/>
                     </a:bodyPr>
                     <a:p>
-                      <a:endParaRPr b="0" lang="en-US" sz="1800" spc="-1" strike="noStrike">
-                        <a:solidFill>
-                          <a:srgbClr val="000000"/>
-                        </a:solidFill>
-                        <a:latin typeface="Arial"/>
-                      </a:endParaRPr>
+                      <a:r>
+                        <a:t>19.33%</a:t>
+                      </a:r>
                     </a:p>
                   </a:txBody>
                   <a:tcPr anchor="t" marL="36000" marR="36000">
@@ -4383,12 +4365,9 @@
                       <a:noAutofit/>
                     </a:bodyPr>
                     <a:p>
-                      <a:endParaRPr b="0" lang="en-US" sz="1800" spc="-1" strike="noStrike">
-                        <a:solidFill>
-                          <a:srgbClr val="000000"/>
-                        </a:solidFill>
-                        <a:latin typeface="Arial"/>
-                      </a:endParaRPr>
+                      <a:r>
+                        <a:t>-5.96%</a:t>
+                      </a:r>
                     </a:p>
                   </a:txBody>
                   <a:tcPr anchor="t" marL="36000" marR="36000">

</xml_diff>

<commit_message>
reformatted table, integrated LLM analysis into the presi_pull_test.py
</commit_message>
<xml_diff>
--- a/pull_test.pptx
+++ b/pull_test.pptx
@@ -69,7 +69,7 @@
         <p:txBody>
           <a:bodyPr/>
           <a:p>
-            <a:fld id="{BD6C315C-8606-4592-88A5-FC4E699CBA9B}" type="slidenum">
+            <a:fld id="{9A97E3A3-F0AA-4D79-816C-65F344C0C36A}" type="slidenum">
               <a:t>&lt;#&gt;</a:t>
             </a:fld>
           </a:p>
@@ -232,7 +232,7 @@
         <p:txBody>
           <a:bodyPr/>
           <a:p>
-            <a:fld id="{7BD55E3C-881B-4602-B6CA-52C8FF410E7F}" type="slidenum">
+            <a:fld id="{F8855F3D-E4D4-47CE-9BD3-268943D1CC39}" type="slidenum">
               <a:t>&lt;#&gt;</a:t>
             </a:fld>
           </a:p>
@@ -398,7 +398,7 @@
         <p:txBody>
           <a:bodyPr/>
           <a:p>
-            <a:fld id="{99A1E8E0-2ED9-4B66-9E9F-12C6A695B736}" type="slidenum">
+            <a:fld id="{465F389C-DC4B-4B0E-8E8A-4282683B297C}" type="slidenum">
               <a:t>&lt;#&gt;</a:t>
             </a:fld>
           </a:p>
@@ -481,7 +481,7 @@
         <p:txBody>
           <a:bodyPr/>
           <a:p>
-            <a:fld id="{1C04AA1F-B7C7-4525-9C6F-AD8CBA197F8A}" type="slidenum">
+            <a:fld id="{71E67A9F-3858-4876-A2D2-E03D1016410A}" type="slidenum">
               <a:t>&lt;#&gt;</a:t>
             </a:fld>
           </a:p>
@@ -564,7 +564,7 @@
         <p:txBody>
           <a:bodyPr/>
           <a:p>
-            <a:fld id="{0DD8FAC6-815D-4A99-8409-2D085D997860}" type="slidenum">
+            <a:fld id="{8E99BF95-5B09-47F5-BF09-28B4714F6C69}" type="slidenum">
               <a:t>&lt;#&gt;</a:t>
             </a:fld>
           </a:p>
@@ -622,7 +622,7 @@
         <p:spPr>
           <a:xfrm>
             <a:off x="0" y="3780000"/>
-            <a:ext cx="10078920" cy="1888920"/>
+            <a:ext cx="10078200" cy="1888200"/>
           </a:xfrm>
           <a:prstGeom prst="rect">
             <a:avLst/>
@@ -683,7 +683,7 @@
         <p:spPr>
           <a:xfrm>
             <a:off x="3420000" y="5130000"/>
-            <a:ext cx="3238920" cy="448920"/>
+            <a:ext cx="3238200" cy="448200"/>
           </a:xfrm>
           <a:prstGeom prst="rect">
             <a:avLst/>
@@ -757,7 +757,7 @@
         <p:spPr>
           <a:xfrm>
             <a:off x="7200000" y="5130000"/>
-            <a:ext cx="2338920" cy="448920"/>
+            <a:ext cx="2338200" cy="448200"/>
           </a:xfrm>
           <a:prstGeom prst="rect">
             <a:avLst/>
@@ -800,7 +800,7 @@
                 <a:tab algn="l" pos="0"/>
               </a:tabLst>
             </a:pPr>
-            <a:fld id="{76A8C248-56F8-4847-A1D7-DD5DD69983D2}" type="slidenum">
+            <a:fld id="{7B9EFFE9-A2D0-4DB5-AAC7-3D6FD9D1AE7B}" type="slidenum">
               <a:rPr b="0" lang="en-US" sz="2400" spc="-1" strike="noStrike">
                 <a:solidFill>
                   <a:srgbClr val="dbf5f9"/>
@@ -831,7 +831,7 @@
         <p:spPr>
           <a:xfrm>
             <a:off x="450000" y="5130000"/>
-            <a:ext cx="2338920" cy="448920"/>
+            <a:ext cx="2338200" cy="448200"/>
           </a:xfrm>
           <a:prstGeom prst="rect">
             <a:avLst/>
@@ -915,7 +915,7 @@
         <p:spPr>
           <a:xfrm>
             <a:off x="0" y="3780000"/>
-            <a:ext cx="10078920" cy="1888920"/>
+            <a:ext cx="10078200" cy="1888200"/>
           </a:xfrm>
           <a:prstGeom prst="rect">
             <a:avLst/>
@@ -1025,7 +1025,7 @@
         <p:spPr>
           <a:xfrm>
             <a:off x="3420000" y="5130000"/>
-            <a:ext cx="3238920" cy="448920"/>
+            <a:ext cx="3238200" cy="448200"/>
           </a:xfrm>
           <a:prstGeom prst="rect">
             <a:avLst/>
@@ -1099,7 +1099,7 @@
         <p:spPr>
           <a:xfrm>
             <a:off x="7200000" y="5130000"/>
-            <a:ext cx="2338920" cy="448920"/>
+            <a:ext cx="2338200" cy="448200"/>
           </a:xfrm>
           <a:prstGeom prst="rect">
             <a:avLst/>
@@ -1142,7 +1142,7 @@
                 <a:tab algn="l" pos="0"/>
               </a:tabLst>
             </a:pPr>
-            <a:fld id="{CF0F1C6C-6EAA-46A6-B2FF-14C6D2AA178F}" type="slidenum">
+            <a:fld id="{6FE98226-C283-47DC-BBE8-18D786CAB945}" type="slidenum">
               <a:rPr b="0" lang="en-US" sz="2400" spc="-1" strike="noStrike">
                 <a:solidFill>
                   <a:srgbClr val="dbf5f9"/>
@@ -1173,7 +1173,7 @@
         <p:spPr>
           <a:xfrm>
             <a:off x="450000" y="5130000"/>
-            <a:ext cx="2338920" cy="448920"/>
+            <a:ext cx="2338200" cy="448200"/>
           </a:xfrm>
           <a:prstGeom prst="rect">
             <a:avLst/>
@@ -1481,8 +1481,8 @@
         </p:nvSpPr>
         <p:spPr>
           <a:xfrm flipV="1">
-            <a:off x="0" y="-1440"/>
-            <a:ext cx="10078920" cy="1078920"/>
+            <a:off x="0" y="-2160"/>
+            <a:ext cx="10078200" cy="1078200"/>
           </a:xfrm>
           <a:prstGeom prst="rect">
             <a:avLst/>
@@ -1817,7 +1817,7 @@
         <p:spPr>
           <a:xfrm>
             <a:off x="3420000" y="5130000"/>
-            <a:ext cx="3238920" cy="448920"/>
+            <a:ext cx="3238200" cy="448200"/>
           </a:xfrm>
           <a:prstGeom prst="rect">
             <a:avLst/>
@@ -1889,7 +1889,7 @@
         <p:spPr>
           <a:xfrm>
             <a:off x="7200000" y="5130000"/>
-            <a:ext cx="2338920" cy="448920"/>
+            <a:ext cx="2338200" cy="448200"/>
           </a:xfrm>
           <a:prstGeom prst="rect">
             <a:avLst/>
@@ -1930,7 +1930,7 @@
                 <a:tab algn="l" pos="0"/>
               </a:tabLst>
             </a:pPr>
-            <a:fld id="{18051325-74D1-4719-BCE3-25FA1A1DC687}" type="slidenum">
+            <a:fld id="{5639E821-B54B-4CC2-91DD-7FDCA9AA22E7}" type="slidenum">
               <a:rPr b="0" lang="en-US" sz="2400" spc="-1" strike="noStrike">
                 <a:solidFill>
                   <a:srgbClr val="484848"/>
@@ -1961,7 +1961,7 @@
         <p:spPr>
           <a:xfrm>
             <a:off x="540000" y="5130000"/>
-            <a:ext cx="2338920" cy="448920"/>
+            <a:ext cx="2338200" cy="448200"/>
           </a:xfrm>
           <a:prstGeom prst="rect">
             <a:avLst/>
@@ -2042,8 +2042,8 @@
         </p:nvSpPr>
         <p:spPr>
           <a:xfrm flipV="1">
-            <a:off x="0" y="-1440"/>
-            <a:ext cx="10078920" cy="1078920"/>
+            <a:off x="0" y="-2160"/>
+            <a:ext cx="10078200" cy="1078200"/>
           </a:xfrm>
           <a:prstGeom prst="rect">
             <a:avLst/>
@@ -2104,7 +2104,7 @@
         <p:spPr>
           <a:xfrm>
             <a:off x="3420000" y="5130000"/>
-            <a:ext cx="3238920" cy="448920"/>
+            <a:ext cx="3238200" cy="448200"/>
           </a:xfrm>
           <a:prstGeom prst="rect">
             <a:avLst/>
@@ -2176,7 +2176,7 @@
         <p:spPr>
           <a:xfrm>
             <a:off x="7200000" y="5130000"/>
-            <a:ext cx="2338920" cy="448920"/>
+            <a:ext cx="2338200" cy="448200"/>
           </a:xfrm>
           <a:prstGeom prst="rect">
             <a:avLst/>
@@ -2217,7 +2217,7 @@
                 <a:tab algn="l" pos="0"/>
               </a:tabLst>
             </a:pPr>
-            <a:fld id="{656C185B-081E-4B9D-9E6D-41E1BF938110}" type="slidenum">
+            <a:fld id="{422288F0-BAAF-42A5-B181-688A0D9463DA}" type="slidenum">
               <a:rPr b="0" lang="en-US" sz="2400" spc="-1" strike="noStrike">
                 <a:solidFill>
                   <a:srgbClr val="484848"/>
@@ -2248,7 +2248,7 @@
         <p:spPr>
           <a:xfrm>
             <a:off x="540000" y="5130000"/>
-            <a:ext cx="2338920" cy="448920"/>
+            <a:ext cx="2338200" cy="448200"/>
           </a:xfrm>
           <a:prstGeom prst="rect">
             <a:avLst/>
@@ -2329,8 +2329,8 @@
         </p:nvSpPr>
         <p:spPr>
           <a:xfrm flipV="1">
-            <a:off x="0" y="-1440"/>
-            <a:ext cx="10078920" cy="178920"/>
+            <a:off x="0" y="-2160"/>
+            <a:ext cx="10078200" cy="178200"/>
           </a:xfrm>
           <a:prstGeom prst="rect">
             <a:avLst/>
@@ -2387,7 +2387,7 @@
         <p:spPr>
           <a:xfrm>
             <a:off x="0" y="5580000"/>
-            <a:ext cx="10078920" cy="88920"/>
+            <a:ext cx="10078200" cy="88200"/>
           </a:xfrm>
           <a:prstGeom prst="rect">
             <a:avLst/>
@@ -2448,7 +2448,7 @@
         <p:spPr>
           <a:xfrm>
             <a:off x="3420000" y="5119200"/>
-            <a:ext cx="3238920" cy="448920"/>
+            <a:ext cx="3238200" cy="448200"/>
           </a:xfrm>
           <a:prstGeom prst="rect">
             <a:avLst/>
@@ -2520,7 +2520,7 @@
         <p:spPr>
           <a:xfrm>
             <a:off x="7650000" y="5130000"/>
-            <a:ext cx="1888920" cy="448920"/>
+            <a:ext cx="1888200" cy="448200"/>
           </a:xfrm>
           <a:prstGeom prst="rect">
             <a:avLst/>
@@ -2561,7 +2561,7 @@
                 <a:tab algn="l" pos="0"/>
               </a:tabLst>
             </a:pPr>
-            <a:fld id="{6FAE6C48-0C1B-46B7-85FD-1C89947FBA87}" type="slidenum">
+            <a:fld id="{9096EB27-F218-443D-A0DA-89F47B1C9182}" type="slidenum">
               <a:rPr b="0" lang="en-US" sz="2400" spc="-1" strike="noStrike">
                 <a:solidFill>
                   <a:srgbClr val="484848"/>
@@ -2592,7 +2592,7 @@
         <p:spPr>
           <a:xfrm>
             <a:off x="540000" y="5130000"/>
-            <a:ext cx="2338920" cy="448920"/>
+            <a:ext cx="2338200" cy="448200"/>
           </a:xfrm>
           <a:prstGeom prst="rect">
             <a:avLst/>
@@ -2952,7 +2952,7 @@
         <p:spPr>
           <a:xfrm>
             <a:off x="450000" y="270000"/>
-            <a:ext cx="8998920" cy="3238920"/>
+            <a:ext cx="8998200" cy="3238200"/>
           </a:xfrm>
           <a:prstGeom prst="rect">
             <a:avLst/>
@@ -3007,7 +3007,7 @@
         <p:spPr>
           <a:xfrm>
             <a:off x="450000" y="3870000"/>
-            <a:ext cx="8998920" cy="1168920"/>
+            <a:ext cx="8998200" cy="1168200"/>
           </a:xfrm>
           <a:prstGeom prst="rect">
             <a:avLst/>
@@ -3077,7 +3077,7 @@
         <p:spPr>
           <a:xfrm>
             <a:off x="502920" y="90720"/>
-            <a:ext cx="9070560" cy="945720"/>
+            <a:ext cx="9069840" cy="945000"/>
           </a:xfrm>
           <a:prstGeom prst="rect">
             <a:avLst/>
@@ -3127,7 +3127,7 @@
         </p:nvGraphicFramePr>
         <p:xfrm>
           <a:off x="577080" y="1166400"/>
-          <a:ext cx="12630960" cy="1924200"/>
+          <a:ext cx="8370360" cy="1758240"/>
         </p:xfrm>
         <a:graphic>
           <a:graphicData uri="http://schemas.openxmlformats.org/drawingml/2006/table">
@@ -3136,12 +3136,12 @@
               <a:tblGrid>
                 <a:gridCol w="988200"/>
                 <a:gridCol w="788400"/>
-                <a:gridCol w="722520"/>
-                <a:gridCol w="897840"/>
-                <a:gridCol w="996480"/>
-                <a:gridCol w="919440"/>
-                <a:gridCol w="1379520"/>
-                <a:gridCol w="1379880"/>
+                <a:gridCol w="965520"/>
+                <a:gridCol w="1010160"/>
+                <a:gridCol w="938160"/>
+                <a:gridCol w="1082520"/>
+                <a:gridCol w="1298880"/>
+                <a:gridCol w="1298880"/>
               </a:tblGrid>
               <a:tr h="384840">
                 <a:tc>
@@ -3150,9 +3150,26 @@
                       <a:noAutofit/>
                     </a:bodyPr>
                     <a:p>
+                      <a:pPr>
+                        <a:lnSpc>
+                          <a:spcPct val="100000"/>
+                        </a:lnSpc>
+                      </a:pPr>
                       <a:r>
+                        <a:rPr b="0" lang="en-US" sz="1800" spc="-1" strike="noStrike">
+                          <a:solidFill>
+                            <a:srgbClr val="000000"/>
+                          </a:solidFill>
+                          <a:latin typeface="Arial"/>
+                        </a:rPr>
                         <a:t>Year</a:t>
                       </a:r>
+                      <a:endParaRPr b="0" lang="en-US" sz="1800" spc="-1" strike="noStrike">
+                        <a:solidFill>
+                          <a:srgbClr val="000000"/>
+                        </a:solidFill>
+                        <a:latin typeface="Arial"/>
+                      </a:endParaRPr>
                     </a:p>
                   </a:txBody>
                   <a:tcPr anchor="t" marL="36000" marR="36000">
@@ -3189,9 +3206,26 @@
                       <a:noAutofit/>
                     </a:bodyPr>
                     <a:p>
+                      <a:pPr>
+                        <a:lnSpc>
+                          <a:spcPct val="100000"/>
+                        </a:lnSpc>
+                      </a:pPr>
                       <a:r>
+                        <a:rPr b="0" lang="en-US" sz="1800" spc="-1" strike="noStrike">
+                          <a:solidFill>
+                            <a:srgbClr val="000000"/>
+                          </a:solidFill>
+                          <a:latin typeface="Arial"/>
+                        </a:rPr>
                         <a:t>Spend</a:t>
                       </a:r>
+                      <a:endParaRPr b="0" lang="en-US" sz="1800" spc="-1" strike="noStrike">
+                        <a:solidFill>
+                          <a:srgbClr val="000000"/>
+                        </a:solidFill>
+                        <a:latin typeface="Arial"/>
+                      </a:endParaRPr>
                     </a:p>
                   </a:txBody>
                   <a:tcPr anchor="t" marL="36000" marR="36000">
@@ -3228,9 +3262,26 @@
                       <a:noAutofit/>
                     </a:bodyPr>
                     <a:p>
+                      <a:pPr>
+                        <a:lnSpc>
+                          <a:spcPct val="100000"/>
+                        </a:lnSpc>
+                      </a:pPr>
                       <a:r>
+                        <a:rPr b="0" lang="en-US" sz="1800" spc="-1" strike="noStrike">
+                          <a:solidFill>
+                            <a:srgbClr val="000000"/>
+                          </a:solidFill>
+                          <a:latin typeface="Arial"/>
+                        </a:rPr>
                         <a:t>Impr.</a:t>
                       </a:r>
+                      <a:endParaRPr b="0" lang="en-US" sz="1800" spc="-1" strike="noStrike">
+                        <a:solidFill>
+                          <a:srgbClr val="000000"/>
+                        </a:solidFill>
+                        <a:latin typeface="Arial"/>
+                      </a:endParaRPr>
                     </a:p>
                   </a:txBody>
                   <a:tcPr anchor="t" marL="36000" marR="36000">
@@ -3267,9 +3318,26 @@
                       <a:noAutofit/>
                     </a:bodyPr>
                     <a:p>
+                      <a:pPr>
+                        <a:lnSpc>
+                          <a:spcPct val="100000"/>
+                        </a:lnSpc>
+                      </a:pPr>
                       <a:r>
+                        <a:rPr b="0" lang="en-US" sz="1800" spc="-1" strike="noStrike">
+                          <a:solidFill>
+                            <a:srgbClr val="000000"/>
+                          </a:solidFill>
+                          <a:latin typeface="Arial"/>
+                        </a:rPr>
                         <a:t>Clicks</a:t>
                       </a:r>
+                      <a:endParaRPr b="0" lang="en-US" sz="1800" spc="-1" strike="noStrike">
+                        <a:solidFill>
+                          <a:srgbClr val="000000"/>
+                        </a:solidFill>
+                        <a:latin typeface="Arial"/>
+                      </a:endParaRPr>
                     </a:p>
                   </a:txBody>
                   <a:tcPr anchor="t" marL="36000" marR="36000">
@@ -3306,9 +3374,26 @@
                       <a:noAutofit/>
                     </a:bodyPr>
                     <a:p>
+                      <a:pPr>
+                        <a:lnSpc>
+                          <a:spcPct val="100000"/>
+                        </a:lnSpc>
+                      </a:pPr>
                       <a:r>
+                        <a:rPr b="0" lang="en-US" sz="1800" spc="-1" strike="noStrike">
+                          <a:solidFill>
+                            <a:srgbClr val="000000"/>
+                          </a:solidFill>
+                          <a:latin typeface="Arial"/>
+                        </a:rPr>
                         <a:t>CTR</a:t>
                       </a:r>
+                      <a:endParaRPr b="0" lang="en-US" sz="1800" spc="-1" strike="noStrike">
+                        <a:solidFill>
+                          <a:srgbClr val="000000"/>
+                        </a:solidFill>
+                        <a:latin typeface="Arial"/>
+                      </a:endParaRPr>
                     </a:p>
                   </a:txBody>
                   <a:tcPr anchor="t" marL="36000" marR="36000">
@@ -3345,9 +3430,26 @@
                       <a:noAutofit/>
                     </a:bodyPr>
                     <a:p>
+                      <a:pPr>
+                        <a:lnSpc>
+                          <a:spcPct val="100000"/>
+                        </a:lnSpc>
+                      </a:pPr>
                       <a:r>
+                        <a:rPr b="0" lang="en-US" sz="1800" spc="-1" strike="noStrike">
+                          <a:solidFill>
+                            <a:srgbClr val="000000"/>
+                          </a:solidFill>
+                          <a:latin typeface="Arial"/>
+                        </a:rPr>
                         <a:t>CPC</a:t>
                       </a:r>
+                      <a:endParaRPr b="0" lang="en-US" sz="1800" spc="-1" strike="noStrike">
+                        <a:solidFill>
+                          <a:srgbClr val="000000"/>
+                        </a:solidFill>
+                        <a:latin typeface="Arial"/>
+                      </a:endParaRPr>
                     </a:p>
                   </a:txBody>
                   <a:tcPr anchor="t" marL="36000" marR="36000">
@@ -3384,9 +3486,26 @@
                       <a:noAutofit/>
                     </a:bodyPr>
                     <a:p>
+                      <a:pPr>
+                        <a:lnSpc>
+                          <a:spcPct val="100000"/>
+                        </a:lnSpc>
+                      </a:pPr>
                       <a:r>
+                        <a:rPr b="0" lang="en-US" sz="1800" spc="-1" strike="noStrike">
+                          <a:solidFill>
+                            <a:srgbClr val="000000"/>
+                          </a:solidFill>
+                          <a:latin typeface="Arial"/>
+                        </a:rPr>
                         <a:t>Conversions</a:t>
                       </a:r>
+                      <a:endParaRPr b="0" lang="en-US" sz="1800" spc="-1" strike="noStrike">
+                        <a:solidFill>
+                          <a:srgbClr val="000000"/>
+                        </a:solidFill>
+                        <a:latin typeface="Arial"/>
+                      </a:endParaRPr>
                     </a:p>
                   </a:txBody>
                   <a:tcPr anchor="t" marL="36000" marR="36000">
@@ -3423,9 +3542,26 @@
                       <a:noAutofit/>
                     </a:bodyPr>
                     <a:p>
+                      <a:pPr>
+                        <a:lnSpc>
+                          <a:spcPct val="100000"/>
+                        </a:lnSpc>
+                      </a:pPr>
                       <a:r>
+                        <a:rPr b="0" lang="en-US" sz="1800" spc="-1" strike="noStrike">
+                          <a:solidFill>
+                            <a:srgbClr val="000000"/>
+                          </a:solidFill>
+                          <a:latin typeface="Arial"/>
+                        </a:rPr>
                         <a:t>Conv. Rate</a:t>
                       </a:r>
+                      <a:endParaRPr b="0" lang="en-US" sz="1800" spc="-1" strike="noStrike">
+                        <a:solidFill>
+                          <a:srgbClr val="000000"/>
+                        </a:solidFill>
+                        <a:latin typeface="Arial"/>
+                      </a:endParaRPr>
                     </a:p>
                   </a:txBody>
                   <a:tcPr anchor="t" marL="36000" marR="36000">
@@ -3464,9 +3600,26 @@
                       <a:noAutofit/>
                     </a:bodyPr>
                     <a:p>
+                      <a:pPr>
+                        <a:lnSpc>
+                          <a:spcPct val="100000"/>
+                        </a:lnSpc>
+                      </a:pPr>
                       <a:r>
+                        <a:rPr b="0" lang="en-US" sz="1800" spc="-1" strike="noStrike">
+                          <a:solidFill>
+                            <a:srgbClr val="000000"/>
+                          </a:solidFill>
+                          <a:latin typeface="Arial"/>
+                        </a:rPr>
                         <a:t>2024</a:t>
                       </a:r>
+                      <a:endParaRPr b="0" lang="en-US" sz="1800" spc="-1" strike="noStrike">
+                        <a:solidFill>
+                          <a:srgbClr val="000000"/>
+                        </a:solidFill>
+                        <a:latin typeface="Arial"/>
+                      </a:endParaRPr>
                     </a:p>
                   </a:txBody>
                   <a:tcPr anchor="t" marL="36000" marR="36000">
@@ -3503,9 +3656,26 @@
                       <a:noAutofit/>
                     </a:bodyPr>
                     <a:p>
+                      <a:pPr>
+                        <a:lnSpc>
+                          <a:spcPct val="100000"/>
+                        </a:lnSpc>
+                      </a:pPr>
                       <a:r>
+                        <a:rPr b="0" lang="en-US" sz="1800" spc="-1" strike="noStrike">
+                          <a:solidFill>
+                            <a:srgbClr val="000000"/>
+                          </a:solidFill>
+                          <a:latin typeface="Arial"/>
+                        </a:rPr>
                         <a:t>$25.0k</a:t>
                       </a:r>
+                      <a:endParaRPr b="0" lang="en-US" sz="1800" spc="-1" strike="noStrike">
+                        <a:solidFill>
+                          <a:srgbClr val="000000"/>
+                        </a:solidFill>
+                        <a:latin typeface="Arial"/>
+                      </a:endParaRPr>
                     </a:p>
                   </a:txBody>
                   <a:tcPr anchor="t" marL="36000" marR="36000">
@@ -3542,9 +3712,26 @@
                       <a:noAutofit/>
                     </a:bodyPr>
                     <a:p>
+                      <a:pPr>
+                        <a:lnSpc>
+                          <a:spcPct val="100000"/>
+                        </a:lnSpc>
+                      </a:pPr>
                       <a:r>
-                        <a:t>1031.78M</a:t>
+                        <a:rPr b="0" lang="en-US" sz="1800" spc="-1" strike="noStrike">
+                          <a:solidFill>
+                            <a:srgbClr val="000000"/>
+                          </a:solidFill>
+                          <a:latin typeface="Arial"/>
+                        </a:rPr>
+                        <a:t>10.84M</a:t>
                       </a:r>
+                      <a:endParaRPr b="0" lang="en-US" sz="1800" spc="-1" strike="noStrike">
+                        <a:solidFill>
+                          <a:srgbClr val="000000"/>
+                        </a:solidFill>
+                        <a:latin typeface="Arial"/>
+                      </a:endParaRPr>
                     </a:p>
                   </a:txBody>
                   <a:tcPr anchor="t" marL="36000" marR="36000">
@@ -3581,9 +3768,26 @@
                       <a:noAutofit/>
                     </a:bodyPr>
                     <a:p>
+                      <a:pPr>
+                        <a:lnSpc>
+                          <a:spcPct val="100000"/>
+                        </a:lnSpc>
+                      </a:pPr>
                       <a:r>
-                        <a:t>127.89M</a:t>
+                        <a:rPr b="0" lang="en-US" sz="1800" spc="-1" strike="noStrike">
+                          <a:solidFill>
+                            <a:srgbClr val="000000"/>
+                          </a:solidFill>
+                          <a:latin typeface="Arial"/>
+                        </a:rPr>
+                        <a:t>2.05M</a:t>
                       </a:r>
+                      <a:endParaRPr b="0" lang="en-US" sz="1800" spc="-1" strike="noStrike">
+                        <a:solidFill>
+                          <a:srgbClr val="000000"/>
+                        </a:solidFill>
+                        <a:latin typeface="Arial"/>
+                      </a:endParaRPr>
                     </a:p>
                   </a:txBody>
                   <a:tcPr anchor="t" marL="36000" marR="36000">
@@ -3620,9 +3824,26 @@
                       <a:noAutofit/>
                     </a:bodyPr>
                     <a:p>
+                      <a:pPr>
+                        <a:lnSpc>
+                          <a:spcPct val="100000"/>
+                        </a:lnSpc>
+                      </a:pPr>
                       <a:r>
-                        <a:t>0.12%</a:t>
+                        <a:rPr b="0" lang="en-US" sz="1800" spc="-1" strike="noStrike">
+                          <a:solidFill>
+                            <a:srgbClr val="000000"/>
+                          </a:solidFill>
+                          <a:latin typeface="Arial"/>
+                        </a:rPr>
+                        <a:t>0.19%</a:t>
                       </a:r>
+                      <a:endParaRPr b="0" lang="en-US" sz="1800" spc="-1" strike="noStrike">
+                        <a:solidFill>
+                          <a:srgbClr val="000000"/>
+                        </a:solidFill>
+                        <a:latin typeface="Arial"/>
+                      </a:endParaRPr>
                     </a:p>
                   </a:txBody>
                   <a:tcPr anchor="t" marL="36000" marR="36000">
@@ -3659,9 +3880,26 @@
                       <a:noAutofit/>
                     </a:bodyPr>
                     <a:p>
+                      <a:pPr>
+                        <a:lnSpc>
+                          <a:spcPct val="100000"/>
+                        </a:lnSpc>
+                      </a:pPr>
                       <a:r>
-                        <a:t>$0.0002</a:t>
+                        <a:rPr b="0" lang="en-US" sz="1800" spc="-1" strike="noStrike">
+                          <a:solidFill>
+                            <a:srgbClr val="000000"/>
+                          </a:solidFill>
+                          <a:latin typeface="Arial"/>
+                        </a:rPr>
+                        <a:t>$0.012</a:t>
                       </a:r>
+                      <a:endParaRPr b="0" lang="en-US" sz="1800" spc="-1" strike="noStrike">
+                        <a:solidFill>
+                          <a:srgbClr val="000000"/>
+                        </a:solidFill>
+                        <a:latin typeface="Arial"/>
+                      </a:endParaRPr>
                     </a:p>
                   </a:txBody>
                   <a:tcPr anchor="t" marL="36000" marR="36000">
@@ -3698,9 +3936,26 @@
                       <a:noAutofit/>
                     </a:bodyPr>
                     <a:p>
+                      <a:pPr>
+                        <a:lnSpc>
+                          <a:spcPct val="100000"/>
+                        </a:lnSpc>
+                      </a:pPr>
                       <a:r>
-                        <a:t>16.61M</a:t>
+                        <a:rPr b="0" lang="en-US" sz="1800" spc="-1" strike="noStrike">
+                          <a:solidFill>
+                            <a:srgbClr val="000000"/>
+                          </a:solidFill>
+                          <a:latin typeface="Arial"/>
+                        </a:rPr>
+                        <a:t>3.0M</a:t>
                       </a:r>
+                      <a:endParaRPr b="0" lang="en-US" sz="1800" spc="-1" strike="noStrike">
+                        <a:solidFill>
+                          <a:srgbClr val="000000"/>
+                        </a:solidFill>
+                        <a:latin typeface="Arial"/>
+                      </a:endParaRPr>
                     </a:p>
                   </a:txBody>
                   <a:tcPr anchor="t" marL="36000" marR="36000">
@@ -3737,9 +3992,26 @@
                       <a:noAutofit/>
                     </a:bodyPr>
                     <a:p>
+                      <a:pPr>
+                        <a:lnSpc>
+                          <a:spcPct val="100000"/>
+                        </a:lnSpc>
+                      </a:pPr>
                       <a:r>
-                        <a:t>0.13</a:t>
+                        <a:rPr b="0" lang="en-US" sz="1800" spc="-1" strike="noStrike">
+                          <a:solidFill>
+                            <a:srgbClr val="000000"/>
+                          </a:solidFill>
+                          <a:latin typeface="Arial"/>
+                        </a:rPr>
+                        <a:t>1.47%</a:t>
                       </a:r>
+                      <a:endParaRPr b="0" lang="en-US" sz="1800" spc="-1" strike="noStrike">
+                        <a:solidFill>
+                          <a:srgbClr val="000000"/>
+                        </a:solidFill>
+                        <a:latin typeface="Arial"/>
+                      </a:endParaRPr>
                     </a:p>
                   </a:txBody>
                   <a:tcPr anchor="t" marL="36000" marR="36000">
@@ -3778,9 +4050,26 @@
                       <a:noAutofit/>
                     </a:bodyPr>
                     <a:p>
+                      <a:pPr>
+                        <a:lnSpc>
+                          <a:spcPct val="100000"/>
+                        </a:lnSpc>
+                      </a:pPr>
                       <a:r>
+                        <a:rPr b="0" lang="en-US" sz="1800" spc="-1" strike="noStrike">
+                          <a:solidFill>
+                            <a:srgbClr val="000000"/>
+                          </a:solidFill>
+                          <a:latin typeface="Arial"/>
+                        </a:rPr>
                         <a:t>2023</a:t>
                       </a:r>
+                      <a:endParaRPr b="0" lang="en-US" sz="1800" spc="-1" strike="noStrike">
+                        <a:solidFill>
+                          <a:srgbClr val="000000"/>
+                        </a:solidFill>
+                        <a:latin typeface="Arial"/>
+                      </a:endParaRPr>
                     </a:p>
                   </a:txBody>
                   <a:tcPr anchor="t" marL="36000" marR="36000">
@@ -3817,9 +4106,26 @@
                       <a:noAutofit/>
                     </a:bodyPr>
                     <a:p>
+                      <a:pPr>
+                        <a:lnSpc>
+                          <a:spcPct val="100000"/>
+                        </a:lnSpc>
+                      </a:pPr>
                       <a:r>
+                        <a:rPr b="0" lang="en-US" sz="1800" spc="-1" strike="noStrike">
+                          <a:solidFill>
+                            <a:srgbClr val="000000"/>
+                          </a:solidFill>
+                          <a:latin typeface="Arial"/>
+                        </a:rPr>
                         <a:t>$25.0k</a:t>
                       </a:r>
+                      <a:endParaRPr b="0" lang="en-US" sz="1800" spc="-1" strike="noStrike">
+                        <a:solidFill>
+                          <a:srgbClr val="000000"/>
+                        </a:solidFill>
+                        <a:latin typeface="Arial"/>
+                      </a:endParaRPr>
                     </a:p>
                   </a:txBody>
                   <a:tcPr anchor="t" marL="36000" marR="36000">
@@ -3856,9 +4162,26 @@
                       <a:noAutofit/>
                     </a:bodyPr>
                     <a:p>
+                      <a:pPr>
+                        <a:lnSpc>
+                          <a:spcPct val="100000"/>
+                        </a:lnSpc>
+                      </a:pPr>
                       <a:r>
-                        <a:t>985.01M</a:t>
+                        <a:rPr b="0" lang="en-US" sz="1800" spc="-1" strike="noStrike">
+                          <a:solidFill>
+                            <a:srgbClr val="000000"/>
+                          </a:solidFill>
+                          <a:latin typeface="Arial"/>
+                        </a:rPr>
+                        <a:t>12.92M</a:t>
                       </a:r>
+                      <a:endParaRPr b="0" lang="en-US" sz="1800" spc="-1" strike="noStrike">
+                        <a:solidFill>
+                          <a:srgbClr val="000000"/>
+                        </a:solidFill>
+                        <a:latin typeface="Arial"/>
+                      </a:endParaRPr>
                     </a:p>
                   </a:txBody>
                   <a:tcPr anchor="t" marL="36000" marR="36000">
@@ -3895,9 +4218,26 @@
                       <a:noAutofit/>
                     </a:bodyPr>
                     <a:p>
+                      <a:pPr>
+                        <a:lnSpc>
+                          <a:spcPct val="100000"/>
+                        </a:lnSpc>
+                      </a:pPr>
                       <a:r>
-                        <a:t>100.78M</a:t>
+                        <a:rPr b="0" lang="en-US" sz="1800" spc="-1" strike="noStrike">
+                          <a:solidFill>
+                            <a:srgbClr val="000000"/>
+                          </a:solidFill>
+                          <a:latin typeface="Arial"/>
+                        </a:rPr>
+                        <a:t>2.35M</a:t>
                       </a:r>
+                      <a:endParaRPr b="0" lang="en-US" sz="1800" spc="-1" strike="noStrike">
+                        <a:solidFill>
+                          <a:srgbClr val="000000"/>
+                        </a:solidFill>
+                        <a:latin typeface="Arial"/>
+                      </a:endParaRPr>
                     </a:p>
                   </a:txBody>
                   <a:tcPr anchor="t" marL="36000" marR="36000">
@@ -3934,9 +4274,26 @@
                       <a:noAutofit/>
                     </a:bodyPr>
                     <a:p>
+                      <a:pPr>
+                        <a:lnSpc>
+                          <a:spcPct val="100000"/>
+                        </a:lnSpc>
+                      </a:pPr>
                       <a:r>
-                        <a:t>0.1%</a:t>
+                        <a:rPr b="0" lang="en-US" sz="1800" spc="-1" strike="noStrike">
+                          <a:solidFill>
+                            <a:srgbClr val="000000"/>
+                          </a:solidFill>
+                          <a:latin typeface="Arial"/>
+                        </a:rPr>
+                        <a:t>0.18%</a:t>
                       </a:r>
+                      <a:endParaRPr b="0" lang="en-US" sz="1800" spc="-1" strike="noStrike">
+                        <a:solidFill>
+                          <a:srgbClr val="000000"/>
+                        </a:solidFill>
+                        <a:latin typeface="Arial"/>
+                      </a:endParaRPr>
                     </a:p>
                   </a:txBody>
                   <a:tcPr anchor="t" marL="36000" marR="36000">
@@ -3973,9 +4330,26 @@
                       <a:noAutofit/>
                     </a:bodyPr>
                     <a:p>
+                      <a:pPr>
+                        <a:lnSpc>
+                          <a:spcPct val="100000"/>
+                        </a:lnSpc>
+                      </a:pPr>
                       <a:r>
-                        <a:t>$0.00025</a:t>
+                        <a:rPr b="0" lang="en-US" sz="1800" spc="-1" strike="noStrike">
+                          <a:solidFill>
+                            <a:srgbClr val="000000"/>
+                          </a:solidFill>
+                          <a:latin typeface="Arial"/>
+                        </a:rPr>
+                        <a:t>$0.011</a:t>
                       </a:r>
+                      <a:endParaRPr b="0" lang="en-US" sz="1800" spc="-1" strike="noStrike">
+                        <a:solidFill>
+                          <a:srgbClr val="000000"/>
+                        </a:solidFill>
+                        <a:latin typeface="Arial"/>
+                      </a:endParaRPr>
                     </a:p>
                   </a:txBody>
                   <a:tcPr anchor="t" marL="36000" marR="36000">
@@ -4012,9 +4386,26 @@
                       <a:noAutofit/>
                     </a:bodyPr>
                     <a:p>
+                      <a:pPr>
+                        <a:lnSpc>
+                          <a:spcPct val="100000"/>
+                        </a:lnSpc>
+                      </a:pPr>
                       <a:r>
-                        <a:t>13.92M</a:t>
+                        <a:rPr b="0" lang="en-US" sz="1800" spc="-1" strike="noStrike">
+                          <a:solidFill>
+                            <a:srgbClr val="000000"/>
+                          </a:solidFill>
+                          <a:latin typeface="Arial"/>
+                        </a:rPr>
+                        <a:t>3.05M</a:t>
                       </a:r>
+                      <a:endParaRPr b="0" lang="en-US" sz="1800" spc="-1" strike="noStrike">
+                        <a:solidFill>
+                          <a:srgbClr val="000000"/>
+                        </a:solidFill>
+                        <a:latin typeface="Arial"/>
+                      </a:endParaRPr>
                     </a:p>
                   </a:txBody>
                   <a:tcPr anchor="t" marL="36000" marR="36000">
@@ -4051,9 +4442,26 @@
                       <a:noAutofit/>
                     </a:bodyPr>
                     <a:p>
+                      <a:pPr>
+                        <a:lnSpc>
+                          <a:spcPct val="100000"/>
+                        </a:lnSpc>
+                      </a:pPr>
                       <a:r>
-                        <a:t>0.14</a:t>
+                        <a:rPr b="0" lang="en-US" sz="1800" spc="-1" strike="noStrike">
+                          <a:solidFill>
+                            <a:srgbClr val="000000"/>
+                          </a:solidFill>
+                          <a:latin typeface="Arial"/>
+                        </a:rPr>
+                        <a:t>1.3%</a:t>
                       </a:r>
+                      <a:endParaRPr b="0" lang="en-US" sz="1800" spc="-1" strike="noStrike">
+                        <a:solidFill>
+                          <a:srgbClr val="000000"/>
+                        </a:solidFill>
+                        <a:latin typeface="Arial"/>
+                      </a:endParaRPr>
                     </a:p>
                   </a:txBody>
                   <a:tcPr anchor="t" marL="36000" marR="36000">
@@ -4092,9 +4500,26 @@
                       <a:noAutofit/>
                     </a:bodyPr>
                     <a:p>
+                      <a:pPr>
+                        <a:lnSpc>
+                          <a:spcPct val="100000"/>
+                        </a:lnSpc>
+                      </a:pPr>
                       <a:r>
+                        <a:rPr b="0" lang="en-US" sz="1800" spc="-1" strike="noStrike">
+                          <a:solidFill>
+                            <a:srgbClr val="000000"/>
+                          </a:solidFill>
+                          <a:latin typeface="Arial"/>
+                        </a:rPr>
                         <a:t>YoY</a:t>
                       </a:r>
+                      <a:endParaRPr b="0" lang="en-US" sz="1800" spc="-1" strike="noStrike">
+                        <a:solidFill>
+                          <a:srgbClr val="000000"/>
+                        </a:solidFill>
+                        <a:latin typeface="Arial"/>
+                      </a:endParaRPr>
                     </a:p>
                   </a:txBody>
                   <a:tcPr anchor="t" marL="36000" marR="36000">
@@ -4131,9 +4556,26 @@
                       <a:noAutofit/>
                     </a:bodyPr>
                     <a:p>
+                      <a:pPr>
+                        <a:lnSpc>
+                          <a:spcPct val="100000"/>
+                        </a:lnSpc>
+                      </a:pPr>
                       <a:r>
+                        <a:rPr b="0" lang="en-US" sz="1800" spc="-1" strike="noStrike">
+                          <a:solidFill>
+                            <a:srgbClr val="000000"/>
+                          </a:solidFill>
+                          <a:latin typeface="Arial"/>
+                        </a:rPr>
                         <a:t>0.0%</a:t>
                       </a:r>
+                      <a:endParaRPr b="0" lang="en-US" sz="1800" spc="-1" strike="noStrike">
+                        <a:solidFill>
+                          <a:srgbClr val="000000"/>
+                        </a:solidFill>
+                        <a:latin typeface="Arial"/>
+                      </a:endParaRPr>
                     </a:p>
                   </a:txBody>
                   <a:tcPr anchor="t" marL="36000" marR="36000">
@@ -4170,9 +4612,26 @@
                       <a:noAutofit/>
                     </a:bodyPr>
                     <a:p>
+                      <a:pPr>
+                        <a:lnSpc>
+                          <a:spcPct val="100000"/>
+                        </a:lnSpc>
+                      </a:pPr>
                       <a:r>
-                        <a:t>4.75%</a:t>
+                        <a:rPr b="0" lang="en-US" sz="1800" spc="-1" strike="noStrike">
+                          <a:solidFill>
+                            <a:srgbClr val="000000"/>
+                          </a:solidFill>
+                          <a:latin typeface="Arial"/>
+                        </a:rPr>
+                        <a:t>-16.08%</a:t>
                       </a:r>
+                      <a:endParaRPr b="0" lang="en-US" sz="1800" spc="-1" strike="noStrike">
+                        <a:solidFill>
+                          <a:srgbClr val="000000"/>
+                        </a:solidFill>
+                        <a:latin typeface="Arial"/>
+                      </a:endParaRPr>
                     </a:p>
                   </a:txBody>
                   <a:tcPr anchor="t" marL="36000" marR="36000">
@@ -4209,9 +4668,26 @@
                       <a:noAutofit/>
                     </a:bodyPr>
                     <a:p>
+                      <a:pPr>
+                        <a:lnSpc>
+                          <a:spcPct val="100000"/>
+                        </a:lnSpc>
+                      </a:pPr>
                       <a:r>
-                        <a:t>26.9%</a:t>
+                        <a:rPr b="0" lang="en-US" sz="1800" spc="-1" strike="noStrike">
+                          <a:solidFill>
+                            <a:srgbClr val="000000"/>
+                          </a:solidFill>
+                          <a:latin typeface="Arial"/>
+                        </a:rPr>
+                        <a:t>-12.84%</a:t>
                       </a:r>
+                      <a:endParaRPr b="0" lang="en-US" sz="1800" spc="-1" strike="noStrike">
+                        <a:solidFill>
+                          <a:srgbClr val="000000"/>
+                        </a:solidFill>
+                        <a:latin typeface="Arial"/>
+                      </a:endParaRPr>
                     </a:p>
                   </a:txBody>
                   <a:tcPr anchor="t" marL="36000" marR="36000">
@@ -4248,9 +4724,26 @@
                       <a:noAutofit/>
                     </a:bodyPr>
                     <a:p>
+                      <a:pPr>
+                        <a:lnSpc>
+                          <a:spcPct val="100000"/>
+                        </a:lnSpc>
+                      </a:pPr>
                       <a:r>
-                        <a:t>21.14%</a:t>
+                        <a:rPr b="0" lang="en-US" sz="1800" spc="-1" strike="noStrike">
+                          <a:solidFill>
+                            <a:srgbClr val="000000"/>
+                          </a:solidFill>
+                          <a:latin typeface="Arial"/>
+                        </a:rPr>
+                        <a:t>3.86%</a:t>
                       </a:r>
+                      <a:endParaRPr b="0" lang="en-US" sz="1800" spc="-1" strike="noStrike">
+                        <a:solidFill>
+                          <a:srgbClr val="000000"/>
+                        </a:solidFill>
+                        <a:latin typeface="Arial"/>
+                      </a:endParaRPr>
                     </a:p>
                   </a:txBody>
                   <a:tcPr anchor="t" marL="36000" marR="36000">
@@ -4287,9 +4780,26 @@
                       <a:noAutofit/>
                     </a:bodyPr>
                     <a:p>
+                      <a:pPr>
+                        <a:lnSpc>
+                          <a:spcPct val="100000"/>
+                        </a:lnSpc>
+                      </a:pPr>
                       <a:r>
-                        <a:t>-21.2%</a:t>
+                        <a:rPr b="0" lang="en-US" sz="1800" spc="-1" strike="noStrike">
+                          <a:solidFill>
+                            <a:srgbClr val="000000"/>
+                          </a:solidFill>
+                          <a:latin typeface="Arial"/>
+                        </a:rPr>
+                        <a:t>14.73%</a:t>
                       </a:r>
+                      <a:endParaRPr b="0" lang="en-US" sz="1800" spc="-1" strike="noStrike">
+                        <a:solidFill>
+                          <a:srgbClr val="000000"/>
+                        </a:solidFill>
+                        <a:latin typeface="Arial"/>
+                      </a:endParaRPr>
                     </a:p>
                   </a:txBody>
                   <a:tcPr anchor="t" marL="36000" marR="36000">
@@ -4326,9 +4836,26 @@
                       <a:noAutofit/>
                     </a:bodyPr>
                     <a:p>
+                      <a:pPr>
+                        <a:lnSpc>
+                          <a:spcPct val="100000"/>
+                        </a:lnSpc>
+                      </a:pPr>
                       <a:r>
-                        <a:t>19.33%</a:t>
+                        <a:rPr b="0" lang="en-US" sz="1800" spc="-1" strike="noStrike">
+                          <a:solidFill>
+                            <a:srgbClr val="000000"/>
+                          </a:solidFill>
+                          <a:latin typeface="Arial"/>
+                        </a:rPr>
+                        <a:t>-1.41%</a:t>
                       </a:r>
+                      <a:endParaRPr b="0" lang="en-US" sz="1800" spc="-1" strike="noStrike">
+                        <a:solidFill>
+                          <a:srgbClr val="000000"/>
+                        </a:solidFill>
+                        <a:latin typeface="Arial"/>
+                      </a:endParaRPr>
                     </a:p>
                   </a:txBody>
                   <a:tcPr anchor="t" marL="36000" marR="36000">
@@ -4365,341 +4892,20 @@
                       <a:noAutofit/>
                     </a:bodyPr>
                     <a:p>
+                      <a:pPr>
+                        <a:lnSpc>
+                          <a:spcPct val="100000"/>
+                        </a:lnSpc>
+                      </a:pPr>
                       <a:r>
-                        <a:t>-5.96%</a:t>
+                        <a:rPr b="0" lang="en-US" sz="1800" spc="-1" strike="noStrike">
+                          <a:solidFill>
+                            <a:srgbClr val="000000"/>
+                          </a:solidFill>
+                          <a:latin typeface="Arial"/>
+                        </a:rPr>
+                        <a:t>13.11%</a:t>
                       </a:r>
-                    </a:p>
-                  </a:txBody>
-                  <a:tcPr anchor="t" marL="36000" marR="36000">
-                    <a:lnL w="7200">
-                      <a:solidFill>
-                        <a:srgbClr val="000000"/>
-                      </a:solidFill>
-                      <a:prstDash val="solid"/>
-                    </a:lnL>
-                    <a:lnR w="7200">
-                      <a:solidFill>
-                        <a:srgbClr val="000000"/>
-                      </a:solidFill>
-                      <a:prstDash val="solid"/>
-                    </a:lnR>
-                    <a:lnT w="7200">
-                      <a:solidFill>
-                        <a:srgbClr val="000000"/>
-                      </a:solidFill>
-                      <a:prstDash val="solid"/>
-                    </a:lnT>
-                    <a:lnB w="7200">
-                      <a:solidFill>
-                        <a:srgbClr val="000000"/>
-                      </a:solidFill>
-                      <a:prstDash val="solid"/>
-                    </a:lnB>
-                    <a:noFill/>
-                  </a:tcPr>
-                </a:tc>
-              </a:tr>
-              <a:tr h="384840">
-                <a:tc>
-                  <a:txBody>
-                    <a:bodyPr lIns="36000" rIns="36000" anchor="t">
-                      <a:noAutofit/>
-                    </a:bodyPr>
-                    <a:p>
-                      <a:endParaRPr b="0" lang="en-US" sz="1800" spc="-1" strike="noStrike">
-                        <a:solidFill>
-                          <a:srgbClr val="000000"/>
-                        </a:solidFill>
-                        <a:latin typeface="Arial"/>
-                      </a:endParaRPr>
-                    </a:p>
-                  </a:txBody>
-                  <a:tcPr anchor="t" marL="36000" marR="36000">
-                    <a:lnL w="7200">
-                      <a:solidFill>
-                        <a:srgbClr val="000000"/>
-                      </a:solidFill>
-                      <a:prstDash val="solid"/>
-                    </a:lnL>
-                    <a:lnR w="7200">
-                      <a:solidFill>
-                        <a:srgbClr val="000000"/>
-                      </a:solidFill>
-                      <a:prstDash val="solid"/>
-                    </a:lnR>
-                    <a:lnT w="7200">
-                      <a:solidFill>
-                        <a:srgbClr val="000000"/>
-                      </a:solidFill>
-                      <a:prstDash val="solid"/>
-                    </a:lnT>
-                    <a:lnB w="7200">
-                      <a:solidFill>
-                        <a:srgbClr val="000000"/>
-                      </a:solidFill>
-                      <a:prstDash val="solid"/>
-                    </a:lnB>
-                    <a:noFill/>
-                  </a:tcPr>
-                </a:tc>
-                <a:tc>
-                  <a:txBody>
-                    <a:bodyPr lIns="36000" rIns="36000" anchor="t">
-                      <a:noAutofit/>
-                    </a:bodyPr>
-                    <a:p>
-                      <a:endParaRPr b="0" lang="en-US" sz="1800" spc="-1" strike="noStrike">
-                        <a:solidFill>
-                          <a:srgbClr val="000000"/>
-                        </a:solidFill>
-                        <a:latin typeface="Arial"/>
-                      </a:endParaRPr>
-                    </a:p>
-                  </a:txBody>
-                  <a:tcPr anchor="t" marL="36000" marR="36000">
-                    <a:lnL w="7200">
-                      <a:solidFill>
-                        <a:srgbClr val="000000"/>
-                      </a:solidFill>
-                      <a:prstDash val="solid"/>
-                    </a:lnL>
-                    <a:lnR w="7200">
-                      <a:solidFill>
-                        <a:srgbClr val="000000"/>
-                      </a:solidFill>
-                      <a:prstDash val="solid"/>
-                    </a:lnR>
-                    <a:lnT w="7200">
-                      <a:solidFill>
-                        <a:srgbClr val="000000"/>
-                      </a:solidFill>
-                      <a:prstDash val="solid"/>
-                    </a:lnT>
-                    <a:lnB w="7200">
-                      <a:solidFill>
-                        <a:srgbClr val="000000"/>
-                      </a:solidFill>
-                      <a:prstDash val="solid"/>
-                    </a:lnB>
-                    <a:noFill/>
-                  </a:tcPr>
-                </a:tc>
-                <a:tc>
-                  <a:txBody>
-                    <a:bodyPr lIns="36000" rIns="36000" anchor="t">
-                      <a:noAutofit/>
-                    </a:bodyPr>
-                    <a:p>
-                      <a:endParaRPr b="0" lang="en-US" sz="1800" spc="-1" strike="noStrike">
-                        <a:solidFill>
-                          <a:srgbClr val="000000"/>
-                        </a:solidFill>
-                        <a:latin typeface="Arial"/>
-                      </a:endParaRPr>
-                    </a:p>
-                  </a:txBody>
-                  <a:tcPr anchor="t" marL="36000" marR="36000">
-                    <a:lnL w="7200">
-                      <a:solidFill>
-                        <a:srgbClr val="000000"/>
-                      </a:solidFill>
-                      <a:prstDash val="solid"/>
-                    </a:lnL>
-                    <a:lnR w="7200">
-                      <a:solidFill>
-                        <a:srgbClr val="000000"/>
-                      </a:solidFill>
-                      <a:prstDash val="solid"/>
-                    </a:lnR>
-                    <a:lnT w="7200">
-                      <a:solidFill>
-                        <a:srgbClr val="000000"/>
-                      </a:solidFill>
-                      <a:prstDash val="solid"/>
-                    </a:lnT>
-                    <a:lnB w="7200">
-                      <a:solidFill>
-                        <a:srgbClr val="000000"/>
-                      </a:solidFill>
-                      <a:prstDash val="solid"/>
-                    </a:lnB>
-                    <a:noFill/>
-                  </a:tcPr>
-                </a:tc>
-                <a:tc>
-                  <a:txBody>
-                    <a:bodyPr lIns="36000" rIns="36000" anchor="t">
-                      <a:noAutofit/>
-                    </a:bodyPr>
-                    <a:p>
-                      <a:endParaRPr b="0" lang="en-US" sz="1800" spc="-1" strike="noStrike">
-                        <a:solidFill>
-                          <a:srgbClr val="000000"/>
-                        </a:solidFill>
-                        <a:latin typeface="Arial"/>
-                      </a:endParaRPr>
-                    </a:p>
-                  </a:txBody>
-                  <a:tcPr anchor="t" marL="36000" marR="36000">
-                    <a:lnL w="7200">
-                      <a:solidFill>
-                        <a:srgbClr val="000000"/>
-                      </a:solidFill>
-                      <a:prstDash val="solid"/>
-                    </a:lnL>
-                    <a:lnR w="7200">
-                      <a:solidFill>
-                        <a:srgbClr val="000000"/>
-                      </a:solidFill>
-                      <a:prstDash val="solid"/>
-                    </a:lnR>
-                    <a:lnT w="7200">
-                      <a:solidFill>
-                        <a:srgbClr val="000000"/>
-                      </a:solidFill>
-                      <a:prstDash val="solid"/>
-                    </a:lnT>
-                    <a:lnB w="7200">
-                      <a:solidFill>
-                        <a:srgbClr val="000000"/>
-                      </a:solidFill>
-                      <a:prstDash val="solid"/>
-                    </a:lnB>
-                    <a:noFill/>
-                  </a:tcPr>
-                </a:tc>
-                <a:tc>
-                  <a:txBody>
-                    <a:bodyPr lIns="36000" rIns="36000" anchor="t">
-                      <a:noAutofit/>
-                    </a:bodyPr>
-                    <a:p>
-                      <a:endParaRPr b="0" lang="en-US" sz="1800" spc="-1" strike="noStrike">
-                        <a:solidFill>
-                          <a:srgbClr val="000000"/>
-                        </a:solidFill>
-                        <a:latin typeface="Arial"/>
-                      </a:endParaRPr>
-                    </a:p>
-                  </a:txBody>
-                  <a:tcPr anchor="t" marL="36000" marR="36000">
-                    <a:lnL w="7200">
-                      <a:solidFill>
-                        <a:srgbClr val="000000"/>
-                      </a:solidFill>
-                      <a:prstDash val="solid"/>
-                    </a:lnL>
-                    <a:lnR w="7200">
-                      <a:solidFill>
-                        <a:srgbClr val="000000"/>
-                      </a:solidFill>
-                      <a:prstDash val="solid"/>
-                    </a:lnR>
-                    <a:lnT w="7200">
-                      <a:solidFill>
-                        <a:srgbClr val="000000"/>
-                      </a:solidFill>
-                      <a:prstDash val="solid"/>
-                    </a:lnT>
-                    <a:lnB w="7200">
-                      <a:solidFill>
-                        <a:srgbClr val="000000"/>
-                      </a:solidFill>
-                      <a:prstDash val="solid"/>
-                    </a:lnB>
-                    <a:noFill/>
-                  </a:tcPr>
-                </a:tc>
-                <a:tc>
-                  <a:txBody>
-                    <a:bodyPr lIns="36000" rIns="36000" anchor="t">
-                      <a:noAutofit/>
-                    </a:bodyPr>
-                    <a:p>
-                      <a:endParaRPr b="0" lang="en-US" sz="1800" spc="-1" strike="noStrike">
-                        <a:solidFill>
-                          <a:srgbClr val="000000"/>
-                        </a:solidFill>
-                        <a:latin typeface="Arial"/>
-                      </a:endParaRPr>
-                    </a:p>
-                  </a:txBody>
-                  <a:tcPr anchor="t" marL="36000" marR="36000">
-                    <a:lnL w="7200">
-                      <a:solidFill>
-                        <a:srgbClr val="000000"/>
-                      </a:solidFill>
-                      <a:prstDash val="solid"/>
-                    </a:lnL>
-                    <a:lnR w="7200">
-                      <a:solidFill>
-                        <a:srgbClr val="000000"/>
-                      </a:solidFill>
-                      <a:prstDash val="solid"/>
-                    </a:lnR>
-                    <a:lnT w="7200">
-                      <a:solidFill>
-                        <a:srgbClr val="000000"/>
-                      </a:solidFill>
-                      <a:prstDash val="solid"/>
-                    </a:lnT>
-                    <a:lnB w="7200">
-                      <a:solidFill>
-                        <a:srgbClr val="000000"/>
-                      </a:solidFill>
-                      <a:prstDash val="solid"/>
-                    </a:lnB>
-                    <a:noFill/>
-                  </a:tcPr>
-                </a:tc>
-                <a:tc>
-                  <a:txBody>
-                    <a:bodyPr lIns="36000" rIns="36000" anchor="t">
-                      <a:noAutofit/>
-                    </a:bodyPr>
-                    <a:p>
-                      <a:endParaRPr b="0" lang="en-US" sz="1800" spc="-1" strike="noStrike">
-                        <a:solidFill>
-                          <a:srgbClr val="000000"/>
-                        </a:solidFill>
-                        <a:latin typeface="Arial"/>
-                      </a:endParaRPr>
-                    </a:p>
-                  </a:txBody>
-                  <a:tcPr anchor="t" marL="36000" marR="36000">
-                    <a:lnL w="7200">
-                      <a:solidFill>
-                        <a:srgbClr val="000000"/>
-                      </a:solidFill>
-                      <a:prstDash val="solid"/>
-                    </a:lnL>
-                    <a:lnR w="7200">
-                      <a:solidFill>
-                        <a:srgbClr val="000000"/>
-                      </a:solidFill>
-                      <a:prstDash val="solid"/>
-                    </a:lnR>
-                    <a:lnT w="7200">
-                      <a:solidFill>
-                        <a:srgbClr val="000000"/>
-                      </a:solidFill>
-                      <a:prstDash val="solid"/>
-                    </a:lnT>
-                    <a:lnB w="7200">
-                      <a:solidFill>
-                        <a:srgbClr val="000000"/>
-                      </a:solidFill>
-                      <a:prstDash val="solid"/>
-                    </a:lnB>
-                    <a:noFill/>
-                  </a:tcPr>
-                </a:tc>
-                <a:tc>
-                  <a:txBody>
-                    <a:bodyPr lIns="36000" rIns="36000" anchor="t">
-                      <a:noAutofit/>
-                    </a:bodyPr>
-                    <a:p>
                       <a:endParaRPr b="0" lang="en-US" sz="1800" spc="-1" strike="noStrike">
                         <a:solidFill>
                           <a:srgbClr val="000000"/>
@@ -4749,8 +4955,8 @@
         </p:nvSpPr>
         <p:spPr>
           <a:xfrm>
-            <a:off x="457200" y="2971800"/>
-            <a:ext cx="8914320" cy="1370520"/>
+            <a:off x="459000" y="3886200"/>
+            <a:ext cx="8913600" cy="1369800"/>
           </a:xfrm>
           <a:prstGeom prst="rect">
             <a:avLst/>
@@ -4777,16 +4983,160 @@
               </a:lnSpc>
             </a:pPr>
             <a:r>
-              <a:rPr b="0" lang="en-US" sz="2200" spc="-1" strike="noStrike">
+              <a:rPr b="0" lang="en-US" sz="1800" spc="-1" strike="noStrike">
                 <a:solidFill>
                   <a:srgbClr val="000000"/>
                 </a:solidFill>
-                <a:latin typeface="Source Sans Pro"/>
+                <a:latin typeface="Arial"/>
                 <a:ea typeface="DejaVu Sans"/>
               </a:rPr>
-              <a:t>Search Performance Breakdown</a:t>
+              <a:t>* QoQ, spend increased by 61.29%, impressions rose by 1683.06%, and clicks grew by 12.36%. However, conversion rate decreased by -55.83%.</a:t>
             </a:r>
-            <a:endParaRPr b="0" lang="en-US" sz="2200" spc="-1" strike="noStrike">
+            <a:endParaRPr b="0" lang="en-US" sz="1800" spc="-1" strike="noStrike">
+              <a:solidFill>
+                <a:srgbClr val="000000"/>
+              </a:solidFill>
+              <a:latin typeface="Arial"/>
+            </a:endParaRPr>
+          </a:p>
+          <a:p>
+            <a:pPr>
+              <a:lnSpc>
+                <a:spcPct val="100000"/>
+              </a:lnSpc>
+            </a:pPr>
+            <a:r>
+              <a:rPr b="0" lang="en-US" sz="1800" spc="-1" strike="noStrike">
+                <a:solidFill>
+                  <a:srgbClr val="000000"/>
+                </a:solidFill>
+                <a:latin typeface="Arial"/>
+                <a:ea typeface="DejaVu Sans"/>
+              </a:rPr>
+              <a:t>* Yoy, there was no change in spend (0%), but conversions dropped by -1.41% and CPA increased by 14.73%.</a:t>
+            </a:r>
+            <a:endParaRPr b="0" lang="en-US" sz="1800" spc="-1" strike="noStrike">
+              <a:solidFill>
+                <a:srgbClr val="000000"/>
+              </a:solidFill>
+              <a:latin typeface="Arial"/>
+            </a:endParaRPr>
+          </a:p>
+          <a:p>
+            <a:pPr>
+              <a:lnSpc>
+                <a:spcPct val="100000"/>
+              </a:lnSpc>
+            </a:pPr>
+            <a:endParaRPr b="0" lang="en-US" sz="1800" spc="-1" strike="noStrike">
+              <a:solidFill>
+                <a:srgbClr val="000000"/>
+              </a:solidFill>
+              <a:latin typeface="Arial"/>
+            </a:endParaRPr>
+          </a:p>
+          <a:p>
+            <a:pPr>
+              <a:lnSpc>
+                <a:spcPct val="100000"/>
+              </a:lnSpc>
+            </a:pPr>
+            <a:r>
+              <a:rPr b="0" lang="en-US" sz="1800" spc="-1" strike="noStrike">
+                <a:solidFill>
+                  <a:srgbClr val="000000"/>
+                </a:solidFill>
+                <a:latin typeface="Arial"/>
+                <a:ea typeface="DejaVu Sans"/>
+              </a:rPr>
+              <a:t>Recommendations:</a:t>
+            </a:r>
+            <a:endParaRPr b="0" lang="en-US" sz="1800" spc="-1" strike="noStrike">
+              <a:solidFill>
+                <a:srgbClr val="000000"/>
+              </a:solidFill>
+              <a:latin typeface="Arial"/>
+            </a:endParaRPr>
+          </a:p>
+          <a:p>
+            <a:pPr>
+              <a:lnSpc>
+                <a:spcPct val="100000"/>
+              </a:lnSpc>
+            </a:pPr>
+            <a:endParaRPr b="0" lang="en-US" sz="1800" spc="-1" strike="noStrike">
+              <a:solidFill>
+                <a:srgbClr val="000000"/>
+              </a:solidFill>
+              <a:latin typeface="Arial"/>
+            </a:endParaRPr>
+          </a:p>
+          <a:p>
+            <a:pPr>
+              <a:lnSpc>
+                <a:spcPct val="100000"/>
+              </a:lnSpc>
+            </a:pPr>
+            <a:r>
+              <a:rPr b="0" lang="en-US" sz="1800" spc="-1" strike="noStrike">
+                <a:solidFill>
+                  <a:srgbClr val="000000"/>
+                </a:solidFill>
+                <a:latin typeface="Arial"/>
+                <a:ea typeface="DejaVu Sans"/>
+              </a:rPr>
+              <a:t>* Focus on optimizing campaigns to improve conversion rates.</a:t>
+            </a:r>
+            <a:endParaRPr b="0" lang="en-US" sz="1800" spc="-1" strike="noStrike">
+              <a:solidFill>
+                <a:srgbClr val="000000"/>
+              </a:solidFill>
+              <a:latin typeface="Arial"/>
+            </a:endParaRPr>
+          </a:p>
+          <a:p>
+            <a:pPr>
+              <a:lnSpc>
+                <a:spcPct val="100000"/>
+              </a:lnSpc>
+            </a:pPr>
+            <a:r>
+              <a:rPr b="0" lang="en-US" sz="1800" spc="-1" strike="noStrike">
+                <a:solidFill>
+                  <a:srgbClr val="000000"/>
+                </a:solidFill>
+                <a:latin typeface="Arial"/>
+                <a:ea typeface="DejaVu Sans"/>
+              </a:rPr>
+              <a:t>* Monitor spend growth and adjust targeting or ad creative as needed.</a:t>
+            </a:r>
+            <a:endParaRPr b="0" lang="en-US" sz="1800" spc="-1" strike="noStrike">
+              <a:solidFill>
+                <a:srgbClr val="000000"/>
+              </a:solidFill>
+              <a:latin typeface="Arial"/>
+            </a:endParaRPr>
+          </a:p>
+          <a:p>
+            <a:pPr>
+              <a:lnSpc>
+                <a:spcPct val="100000"/>
+              </a:lnSpc>
+            </a:pPr>
+            <a:endParaRPr b="0" lang="en-US" sz="1800" spc="-1" strike="noStrike">
+              <a:solidFill>
+                <a:srgbClr val="000000"/>
+              </a:solidFill>
+              <a:latin typeface="Arial"/>
+            </a:endParaRPr>
+          </a:p>
+          <a:p>
+            <a:pPr>
+              <a:lnSpc>
+                <a:spcPct val="100000"/>
+              </a:lnSpc>
+            </a:pPr>
+            <a:endParaRPr b="0" lang="en-US" sz="1800" spc="-1" strike="noStrike">
               <a:solidFill>
                 <a:srgbClr val="000000"/>
               </a:solidFill>
@@ -4838,7 +5188,7 @@
         <p:spPr>
           <a:xfrm>
             <a:off x="502920" y="630720"/>
-            <a:ext cx="9070560" cy="4387680"/>
+            <a:ext cx="9069840" cy="4386960"/>
           </a:xfrm>
           <a:prstGeom prst="rect">
             <a:avLst/>

</xml_diff>